<commit_message>
Moved TAG to tags directory
</commit_message>
<xml_diff>
--- a/slides/Intro to CCSv5.pptx
+++ b/slides/Intro to CCSv5.pptx
@@ -2668,13 +2668,13 @@
           <a:lstStyle/>
           <a:p>
             <a:r>
-              <a:rPr lang="en-US" dirty="0" smtClean="0"/>
+              <a:rPr lang="en-US" smtClean="0"/>
               <a:t> a quick screen shot of CCS and some of its most important features.  Many customers will be familiar with make files, so the concept of a project won’t be very alien.</a:t>
             </a:r>
           </a:p>
           <a:p>
             <a:r>
-              <a:rPr lang="en-US" dirty="0" smtClean="0"/>
+              <a:rPr lang="en-US" smtClean="0"/>
               <a:t>Identify  the menu bar, horizontal and vertical toolbars and project window</a:t>
             </a:r>
           </a:p>
@@ -3156,134 +3156,6 @@
         </p:spPr>
         <p:txBody>
           <a:bodyPr/>
-          <a:lstStyle>
-            <a:lvl1pPr>
-              <a:defRPr>
-                <a:latin typeface="Calibri" pitchFamily="34" charset="0"/>
-                <a:cs typeface="Calibri" pitchFamily="34" charset="0"/>
-              </a:defRPr>
-            </a:lvl1pPr>
-          </a:lstStyle>
-          <a:p>
-            <a:r>
-              <a:rPr lang="en-US" dirty="0" smtClean="0"/>
-              <a:t>Click to edit Master title style</a:t>
-            </a:r>
-            <a:endParaRPr lang="en-US" dirty="0"/>
-          </a:p>
-        </p:txBody>
-      </p:sp>
-      <p:sp>
-        <p:nvSpPr>
-          <p:cNvPr id="3" name="Subtitle 2"/>
-          <p:cNvSpPr>
-            <a:spLocks noGrp="1"/>
-          </p:cNvSpPr>
-          <p:nvPr>
-            <p:ph type="subTitle" idx="1"/>
-          </p:nvPr>
-        </p:nvSpPr>
-        <p:spPr>
-          <a:xfrm>
-            <a:off x="1371600" y="3886200"/>
-            <a:ext cx="6400800" cy="1752600"/>
-          </a:xfrm>
-        </p:spPr>
-        <p:txBody>
-          <a:bodyPr/>
-          <a:lstStyle>
-            <a:lvl1pPr marL="0" indent="0" algn="ctr">
-              <a:buNone/>
-              <a:defRPr>
-                <a:latin typeface="Calibri" pitchFamily="34" charset="0"/>
-                <a:cs typeface="Calibri" pitchFamily="34" charset="0"/>
-              </a:defRPr>
-            </a:lvl1pPr>
-            <a:lvl2pPr marL="457200" indent="0" algn="ctr">
-              <a:buNone/>
-              <a:defRPr/>
-            </a:lvl2pPr>
-            <a:lvl3pPr marL="914400" indent="0" algn="ctr">
-              <a:buNone/>
-              <a:defRPr/>
-            </a:lvl3pPr>
-            <a:lvl4pPr marL="1371600" indent="0" algn="ctr">
-              <a:buNone/>
-              <a:defRPr/>
-            </a:lvl4pPr>
-            <a:lvl5pPr marL="1828800" indent="0" algn="ctr">
-              <a:buNone/>
-              <a:defRPr/>
-            </a:lvl5pPr>
-            <a:lvl6pPr marL="2286000" indent="0" algn="ctr">
-              <a:buNone/>
-              <a:defRPr/>
-            </a:lvl6pPr>
-            <a:lvl7pPr marL="2743200" indent="0" algn="ctr">
-              <a:buNone/>
-              <a:defRPr/>
-            </a:lvl7pPr>
-            <a:lvl8pPr marL="3200400" indent="0" algn="ctr">
-              <a:buNone/>
-              <a:defRPr/>
-            </a:lvl8pPr>
-            <a:lvl9pPr marL="3657600" indent="0" algn="ctr">
-              <a:buNone/>
-              <a:defRPr/>
-            </a:lvl9pPr>
-          </a:lstStyle>
-          <a:p>
-            <a:r>
-              <a:rPr lang="en-US" dirty="0" smtClean="0"/>
-              <a:t>Click to edit Master subtitle style</a:t>
-            </a:r>
-            <a:endParaRPr lang="en-US" dirty="0"/>
-          </a:p>
-        </p:txBody>
-      </p:sp>
-    </p:spTree>
-  </p:cSld>
-  <p:clrMapOvr>
-    <a:masterClrMapping/>
-  </p:clrMapOvr>
-</p:sldLayout>
-</file>
-
-<file path=ppt/slideLayouts/slideLayout11.xml><?xml version="1.0" encoding="utf-8"?>
-<p:sldLayout xmlns:a="http://schemas.openxmlformats.org/drawingml/2006/main" xmlns:r="http://schemas.openxmlformats.org/officeDocument/2006/relationships" xmlns:p="http://schemas.openxmlformats.org/presentationml/2006/main" preserve="1">
-  <p:cSld name="3_Title Slide">
-    <p:spTree>
-      <p:nvGrpSpPr>
-        <p:cNvPr id="1" name=""/>
-        <p:cNvGrpSpPr/>
-        <p:nvPr/>
-      </p:nvGrpSpPr>
-      <p:grpSpPr>
-        <a:xfrm>
-          <a:off x="0" y="0"/>
-          <a:ext cx="0" cy="0"/>
-          <a:chOff x="0" y="0"/>
-          <a:chExt cx="0" cy="0"/>
-        </a:xfrm>
-      </p:grpSpPr>
-      <p:sp>
-        <p:nvSpPr>
-          <p:cNvPr id="2" name="Title 1"/>
-          <p:cNvSpPr>
-            <a:spLocks noGrp="1"/>
-          </p:cNvSpPr>
-          <p:nvPr>
-            <p:ph type="ctrTitle"/>
-          </p:nvPr>
-        </p:nvSpPr>
-        <p:spPr>
-          <a:xfrm>
-            <a:off x="685800" y="2130425"/>
-            <a:ext cx="7772400" cy="1470025"/>
-          </a:xfrm>
-        </p:spPr>
-        <p:txBody>
-          <a:bodyPr/>
           <a:lstStyle/>
           <a:p>
             <a:r>
@@ -3367,7 +3239,243 @@
 </p:sldLayout>
 </file>
 
+<file path=ppt/slideLayouts/slideLayout11.xml><?xml version="1.0" encoding="utf-8"?>
+<p:sldLayout xmlns:a="http://schemas.openxmlformats.org/drawingml/2006/main" xmlns:r="http://schemas.openxmlformats.org/officeDocument/2006/relationships" xmlns:p="http://schemas.openxmlformats.org/presentationml/2006/main" preserve="1">
+  <p:cSld name="2_Title Slide">
+    <p:spTree>
+      <p:nvGrpSpPr>
+        <p:cNvPr id="1" name=""/>
+        <p:cNvGrpSpPr/>
+        <p:nvPr/>
+      </p:nvGrpSpPr>
+      <p:grpSpPr>
+        <a:xfrm>
+          <a:off x="0" y="0"/>
+          <a:ext cx="0" cy="0"/>
+          <a:chOff x="0" y="0"/>
+          <a:chExt cx="0" cy="0"/>
+        </a:xfrm>
+      </p:grpSpPr>
+      <p:sp>
+        <p:nvSpPr>
+          <p:cNvPr id="2" name="Title 1"/>
+          <p:cNvSpPr>
+            <a:spLocks noGrp="1"/>
+          </p:cNvSpPr>
+          <p:nvPr>
+            <p:ph type="ctrTitle"/>
+          </p:nvPr>
+        </p:nvSpPr>
+        <p:spPr>
+          <a:xfrm>
+            <a:off x="685800" y="2130425"/>
+            <a:ext cx="7772400" cy="1470025"/>
+          </a:xfrm>
+        </p:spPr>
+        <p:txBody>
+          <a:bodyPr/>
+          <a:lstStyle/>
+          <a:p>
+            <a:r>
+              <a:rPr lang="en-US" smtClean="0"/>
+              <a:t>Click to edit Master title style</a:t>
+            </a:r>
+            <a:endParaRPr lang="en-US"/>
+          </a:p>
+        </p:txBody>
+      </p:sp>
+      <p:sp>
+        <p:nvSpPr>
+          <p:cNvPr id="3" name="Subtitle 2"/>
+          <p:cNvSpPr>
+            <a:spLocks noGrp="1"/>
+          </p:cNvSpPr>
+          <p:nvPr>
+            <p:ph type="subTitle" idx="1"/>
+          </p:nvPr>
+        </p:nvSpPr>
+        <p:spPr>
+          <a:xfrm>
+            <a:off x="1371600" y="3886200"/>
+            <a:ext cx="6400800" cy="1752600"/>
+          </a:xfrm>
+        </p:spPr>
+        <p:txBody>
+          <a:bodyPr/>
+          <a:lstStyle>
+            <a:lvl1pPr marL="0" indent="0" algn="ctr">
+              <a:buNone/>
+              <a:defRPr/>
+            </a:lvl1pPr>
+            <a:lvl2pPr marL="457200" indent="0" algn="ctr">
+              <a:buNone/>
+              <a:defRPr/>
+            </a:lvl2pPr>
+            <a:lvl3pPr marL="914400" indent="0" algn="ctr">
+              <a:buNone/>
+              <a:defRPr/>
+            </a:lvl3pPr>
+            <a:lvl4pPr marL="1371600" indent="0" algn="ctr">
+              <a:buNone/>
+              <a:defRPr/>
+            </a:lvl4pPr>
+            <a:lvl5pPr marL="1828800" indent="0" algn="ctr">
+              <a:buNone/>
+              <a:defRPr/>
+            </a:lvl5pPr>
+            <a:lvl6pPr marL="2286000" indent="0" algn="ctr">
+              <a:buNone/>
+              <a:defRPr/>
+            </a:lvl6pPr>
+            <a:lvl7pPr marL="2743200" indent="0" algn="ctr">
+              <a:buNone/>
+              <a:defRPr/>
+            </a:lvl7pPr>
+            <a:lvl8pPr marL="3200400" indent="0" algn="ctr">
+              <a:buNone/>
+              <a:defRPr/>
+            </a:lvl8pPr>
+            <a:lvl9pPr marL="3657600" indent="0" algn="ctr">
+              <a:buNone/>
+              <a:defRPr/>
+            </a:lvl9pPr>
+          </a:lstStyle>
+          <a:p>
+            <a:r>
+              <a:rPr lang="en-US" smtClean="0"/>
+              <a:t>Click to edit Master subtitle style</a:t>
+            </a:r>
+            <a:endParaRPr lang="en-US"/>
+          </a:p>
+        </p:txBody>
+      </p:sp>
+    </p:spTree>
+  </p:cSld>
+  <p:clrMapOvr>
+    <a:masterClrMapping/>
+  </p:clrMapOvr>
+</p:sldLayout>
+</file>
+
 <file path=ppt/slideLayouts/slideLayout12.xml><?xml version="1.0" encoding="utf-8"?>
+<p:sldLayout xmlns:a="http://schemas.openxmlformats.org/drawingml/2006/main" xmlns:r="http://schemas.openxmlformats.org/officeDocument/2006/relationships" xmlns:p="http://schemas.openxmlformats.org/presentationml/2006/main" preserve="1">
+  <p:cSld name="3_Title Slide">
+    <p:spTree>
+      <p:nvGrpSpPr>
+        <p:cNvPr id="1" name=""/>
+        <p:cNvGrpSpPr/>
+        <p:nvPr/>
+      </p:nvGrpSpPr>
+      <p:grpSpPr>
+        <a:xfrm>
+          <a:off x="0" y="0"/>
+          <a:ext cx="0" cy="0"/>
+          <a:chOff x="0" y="0"/>
+          <a:chExt cx="0" cy="0"/>
+        </a:xfrm>
+      </p:grpSpPr>
+      <p:sp>
+        <p:nvSpPr>
+          <p:cNvPr id="2" name="Title 1"/>
+          <p:cNvSpPr>
+            <a:spLocks noGrp="1"/>
+          </p:cNvSpPr>
+          <p:nvPr>
+            <p:ph type="ctrTitle"/>
+          </p:nvPr>
+        </p:nvSpPr>
+        <p:spPr>
+          <a:xfrm>
+            <a:off x="685800" y="2130425"/>
+            <a:ext cx="7772400" cy="1470025"/>
+          </a:xfrm>
+        </p:spPr>
+        <p:txBody>
+          <a:bodyPr/>
+          <a:lstStyle/>
+          <a:p>
+            <a:r>
+              <a:rPr lang="en-US" smtClean="0"/>
+              <a:t>Click to edit Master title style</a:t>
+            </a:r>
+            <a:endParaRPr lang="en-US"/>
+          </a:p>
+        </p:txBody>
+      </p:sp>
+      <p:sp>
+        <p:nvSpPr>
+          <p:cNvPr id="3" name="Subtitle 2"/>
+          <p:cNvSpPr>
+            <a:spLocks noGrp="1"/>
+          </p:cNvSpPr>
+          <p:nvPr>
+            <p:ph type="subTitle" idx="1"/>
+          </p:nvPr>
+        </p:nvSpPr>
+        <p:spPr>
+          <a:xfrm>
+            <a:off x="1371600" y="3886200"/>
+            <a:ext cx="6400800" cy="1752600"/>
+          </a:xfrm>
+        </p:spPr>
+        <p:txBody>
+          <a:bodyPr/>
+          <a:lstStyle>
+            <a:lvl1pPr marL="0" indent="0" algn="ctr">
+              <a:buNone/>
+              <a:defRPr/>
+            </a:lvl1pPr>
+            <a:lvl2pPr marL="457200" indent="0" algn="ctr">
+              <a:buNone/>
+              <a:defRPr/>
+            </a:lvl2pPr>
+            <a:lvl3pPr marL="914400" indent="0" algn="ctr">
+              <a:buNone/>
+              <a:defRPr/>
+            </a:lvl3pPr>
+            <a:lvl4pPr marL="1371600" indent="0" algn="ctr">
+              <a:buNone/>
+              <a:defRPr/>
+            </a:lvl4pPr>
+            <a:lvl5pPr marL="1828800" indent="0" algn="ctr">
+              <a:buNone/>
+              <a:defRPr/>
+            </a:lvl5pPr>
+            <a:lvl6pPr marL="2286000" indent="0" algn="ctr">
+              <a:buNone/>
+              <a:defRPr/>
+            </a:lvl6pPr>
+            <a:lvl7pPr marL="2743200" indent="0" algn="ctr">
+              <a:buNone/>
+              <a:defRPr/>
+            </a:lvl7pPr>
+            <a:lvl8pPr marL="3200400" indent="0" algn="ctr">
+              <a:buNone/>
+              <a:defRPr/>
+            </a:lvl8pPr>
+            <a:lvl9pPr marL="3657600" indent="0" algn="ctr">
+              <a:buNone/>
+              <a:defRPr/>
+            </a:lvl9pPr>
+          </a:lstStyle>
+          <a:p>
+            <a:r>
+              <a:rPr lang="en-US" smtClean="0"/>
+              <a:t>Click to edit Master subtitle style</a:t>
+            </a:r>
+            <a:endParaRPr lang="en-US"/>
+          </a:p>
+        </p:txBody>
+      </p:sp>
+    </p:spTree>
+  </p:cSld>
+  <p:clrMapOvr>
+    <a:masterClrMapping/>
+  </p:clrMapOvr>
+</p:sldLayout>
+</file>
+
+<file path=ppt/slideLayouts/slideLayout13.xml><?xml version="1.0" encoding="utf-8"?>
 <p:sldLayout xmlns:a="http://schemas.openxmlformats.org/drawingml/2006/main" xmlns:r="http://schemas.openxmlformats.org/officeDocument/2006/relationships" xmlns:p="http://schemas.openxmlformats.org/presentationml/2006/main" type="tbl">
   <p:cSld name="Title and Table">
     <p:spTree>
@@ -3481,7 +3589,7 @@
           <a:lstStyle/>
           <a:p>
             <a:r>
-              <a:rPr lang="en-US" dirty="0" smtClean="0"/>
+              <a:rPr lang="en-US" smtClean="0"/>
               <a:t>Click to edit Master title style</a:t>
             </a:r>
             <a:endParaRPr lang="en-US" dirty="0"/>
@@ -3757,10 +3865,10 @@
           <a:lstStyle/>
           <a:p>
             <a:r>
-              <a:rPr lang="en-US" dirty="0" smtClean="0"/>
+              <a:rPr lang="en-US" smtClean="0"/>
               <a:t>Click to edit Master title style</a:t>
             </a:r>
-            <a:endParaRPr lang="en-US" dirty="0"/>
+            <a:endParaRPr lang="en-US"/>
           </a:p>
         </p:txBody>
       </p:sp>
@@ -4327,10 +4435,10 @@
           <a:lstStyle/>
           <a:p>
             <a:r>
-              <a:rPr lang="en-US" dirty="0" smtClean="0"/>
+              <a:rPr lang="en-US" smtClean="0"/>
               <a:t>Click to edit Master title style</a:t>
             </a:r>
-            <a:endParaRPr lang="en-US" dirty="0"/>
+            <a:endParaRPr lang="en-US"/>
           </a:p>
         </p:txBody>
       </p:sp>
@@ -4436,54 +4544,19 @@
           <a:bodyPr/>
           <a:lstStyle>
             <a:lvl1pPr>
-              <a:buClrTx/>
-              <a:buSzPct val="100000"/>
-              <a:buFont typeface="Arial" pitchFamily="34" charset="0"/>
-              <a:buChar char="•"/>
-              <a:defRPr sz="3200">
-                <a:latin typeface="Calibri" pitchFamily="34" charset="0"/>
-                <a:cs typeface="Calibri" pitchFamily="34" charset="0"/>
-              </a:defRPr>
+              <a:defRPr sz="3200"/>
             </a:lvl1pPr>
             <a:lvl2pPr>
-              <a:buClrTx/>
-              <a:buSzPct val="100000"/>
-              <a:buFont typeface="Courier New" pitchFamily="49" charset="0"/>
-              <a:buChar char="o"/>
-              <a:defRPr sz="2800">
-                <a:latin typeface="Calibri" pitchFamily="34" charset="0"/>
-                <a:cs typeface="Calibri" pitchFamily="34" charset="0"/>
-              </a:defRPr>
+              <a:defRPr sz="2800"/>
             </a:lvl2pPr>
             <a:lvl3pPr>
-              <a:buClrTx/>
-              <a:buSzPct val="100000"/>
-              <a:buFont typeface="Wingdings" pitchFamily="2" charset="2"/>
-              <a:buChar char="§"/>
-              <a:defRPr sz="2400">
-                <a:latin typeface="Calibri" pitchFamily="34" charset="0"/>
-                <a:cs typeface="Calibri" pitchFamily="34" charset="0"/>
-              </a:defRPr>
+              <a:defRPr sz="2400"/>
             </a:lvl3pPr>
             <a:lvl4pPr>
-              <a:buClrTx/>
-              <a:buSzPct val="100000"/>
-              <a:buFont typeface="Calibri" pitchFamily="34" charset="0"/>
-              <a:buChar char="―"/>
-              <a:defRPr sz="2000">
-                <a:latin typeface="Calibri" pitchFamily="34" charset="0"/>
-                <a:cs typeface="Calibri" pitchFamily="34" charset="0"/>
-              </a:defRPr>
+              <a:defRPr sz="2000"/>
             </a:lvl4pPr>
             <a:lvl5pPr>
-              <a:buClrTx/>
-              <a:buSzPct val="100000"/>
-              <a:buFont typeface="Arial" pitchFamily="34" charset="0"/>
-              <a:buChar char="•"/>
-              <a:defRPr sz="2000">
-                <a:latin typeface="Calibri" pitchFamily="34" charset="0"/>
-                <a:cs typeface="Calibri" pitchFamily="34" charset="0"/>
-              </a:defRPr>
+              <a:defRPr sz="2000"/>
             </a:lvl5pPr>
             <a:lvl6pPr>
               <a:defRPr sz="2000"/>
@@ -4501,30 +4574,38 @@
           <a:p>
             <a:pPr lvl="0"/>
             <a:r>
-              <a:rPr lang="en-US" dirty="0" smtClean="0"/>
+              <a:rPr lang="en-US" smtClean="0"/>
               <a:t>Click to edit Master text styles</a:t>
             </a:r>
           </a:p>
           <a:p>
             <a:pPr lvl="1"/>
             <a:r>
-              <a:rPr lang="en-US" dirty="0" smtClean="0"/>
+              <a:rPr lang="en-US" smtClean="0"/>
               <a:t>Second level</a:t>
             </a:r>
           </a:p>
           <a:p>
             <a:pPr lvl="2"/>
             <a:r>
-              <a:rPr lang="en-US" dirty="0" smtClean="0"/>
+              <a:rPr lang="en-US" smtClean="0"/>
               <a:t>Third level</a:t>
             </a:r>
           </a:p>
           <a:p>
             <a:pPr lvl="3"/>
             <a:r>
-              <a:rPr lang="en-US" dirty="0" smtClean="0"/>
+              <a:rPr lang="en-US" smtClean="0"/>
               <a:t>Fourth level</a:t>
             </a:r>
+          </a:p>
+          <a:p>
+            <a:pPr lvl="4"/>
+            <a:r>
+              <a:rPr lang="en-US" smtClean="0"/>
+              <a:t>Fifth level</a:t>
+            </a:r>
+            <a:endParaRPr lang="en-US"/>
           </a:p>
         </p:txBody>
       </p:sp>
@@ -4836,7 +4917,7 @@
           <a:lstStyle/>
           <a:p>
             <a:r>
-              <a:rPr lang="en-US" dirty="0" smtClean="0"/>
+              <a:rPr lang="en-US" smtClean="0"/>
               <a:t>Click to edit Master title style</a:t>
             </a:r>
             <a:endParaRPr lang="en-US" dirty="0"/>
@@ -4870,60 +4951,44 @@
           <a:p>
             <a:pPr lvl="0"/>
             <a:r>
-              <a:rPr lang="en-US" dirty="0" smtClean="0"/>
+              <a:rPr lang="en-US" smtClean="0"/>
               <a:t>Click to edit Master text styles</a:t>
             </a:r>
           </a:p>
           <a:p>
             <a:pPr lvl="1"/>
             <a:r>
-              <a:rPr lang="en-US" dirty="0" smtClean="0"/>
+              <a:rPr lang="en-US" smtClean="0"/>
               <a:t>Second level</a:t>
             </a:r>
           </a:p>
           <a:p>
             <a:pPr lvl="2"/>
             <a:r>
-              <a:rPr lang="en-US" dirty="0" smtClean="0"/>
+              <a:rPr lang="en-US" smtClean="0"/>
               <a:t>Third level</a:t>
             </a:r>
           </a:p>
           <a:p>
             <a:pPr lvl="3"/>
             <a:r>
-              <a:rPr lang="en-US" dirty="0" smtClean="0"/>
+              <a:rPr lang="en-US" smtClean="0"/>
               <a:t>Fourth level</a:t>
             </a:r>
+          </a:p>
+          <a:p>
+            <a:pPr lvl="4"/>
+            <a:r>
+              <a:rPr lang="en-US" smtClean="0"/>
+              <a:t>Fifth level</a:t>
+            </a:r>
+            <a:endParaRPr lang="en-US" dirty="0"/>
           </a:p>
         </p:txBody>
       </p:sp>
       <p:pic>
         <p:nvPicPr>
           <p:cNvPr id="7" name="TI Logo Color One Line" descr="tilogo_color_oneline.png" hidden="1"/>
-          <p:cNvPicPr>
-            <a:picLocks noChangeAspect="1"/>
-          </p:cNvPicPr>
-          <p:nvPr/>
-        </p:nvPicPr>
-        <p:blipFill>
-          <a:blip r:embed="rId16" cstate="print"/>
-          <a:stretch>
-            <a:fillRect/>
-          </a:stretch>
-        </p:blipFill>
-        <p:spPr>
-          <a:xfrm>
-            <a:off x="147730" y="6101890"/>
-            <a:ext cx="1840840" cy="237724"/>
-          </a:xfrm>
-          <a:prstGeom prst="rect">
-            <a:avLst/>
-          </a:prstGeom>
-        </p:spPr>
-      </p:pic>
-      <p:pic>
-        <p:nvPicPr>
-          <p:cNvPr id="8" name="TI Logo White One Line" descr="tilogo_bw_oneline.png" hidden="1"/>
           <p:cNvPicPr>
             <a:picLocks noChangeAspect="1"/>
           </p:cNvPicPr>
@@ -4937,8 +5002,8 @@
         </p:blipFill>
         <p:spPr>
           <a:xfrm>
-            <a:off x="136939" y="5288938"/>
-            <a:ext cx="1822553" cy="237724"/>
+            <a:off x="147730" y="6101890"/>
+            <a:ext cx="1840840" cy="237724"/>
           </a:xfrm>
           <a:prstGeom prst="rect">
             <a:avLst/>
@@ -4947,7 +5012,7 @@
       </p:pic>
       <p:pic>
         <p:nvPicPr>
-          <p:cNvPr id="9" name="TI Logo White Stack" descr="tilogo_bw_twoline.png" hidden="1"/>
+          <p:cNvPr id="8" name="TI Logo White One Line" descr="tilogo_bw_oneline.png" hidden="1"/>
           <p:cNvPicPr>
             <a:picLocks noChangeAspect="1"/>
           </p:cNvPicPr>
@@ -4961,6 +5026,30 @@
         </p:blipFill>
         <p:spPr>
           <a:xfrm>
+            <a:off x="136939" y="5288938"/>
+            <a:ext cx="1822553" cy="237724"/>
+          </a:xfrm>
+          <a:prstGeom prst="rect">
+            <a:avLst/>
+          </a:prstGeom>
+        </p:spPr>
+      </p:pic>
+      <p:pic>
+        <p:nvPicPr>
+          <p:cNvPr id="9" name="TI Logo White Stack" descr="tilogo_bw_twoline.png" hidden="1"/>
+          <p:cNvPicPr>
+            <a:picLocks noChangeAspect="1"/>
+          </p:cNvPicPr>
+          <p:nvPr/>
+        </p:nvPicPr>
+        <p:blipFill>
+          <a:blip r:embed="rId19" cstate="print"/>
+          <a:stretch>
+            <a:fillRect/>
+          </a:stretch>
+        </p:blipFill>
+        <p:spPr>
+          <a:xfrm>
             <a:off x="121847" y="5656160"/>
             <a:ext cx="1456824" cy="353539"/>
           </a:xfrm>
@@ -4978,7 +5067,7 @@
           <p:nvPr/>
         </p:nvPicPr>
         <p:blipFill>
-          <a:blip r:embed="rId19" cstate="print"/>
+          <a:blip r:embed="rId20" cstate="print"/>
           <a:stretch>
             <a:fillRect/>
           </a:stretch>
@@ -5051,12 +5140,12 @@
           </p:cNvPicPr>
           <p:nvPr userDrawn="1">
             <p:custDataLst>
-              <p:tags r:id="rId14"/>
+              <p:tags r:id="rId15"/>
             </p:custDataLst>
           </p:nvPr>
         </p:nvPicPr>
         <p:blipFill>
-          <a:blip r:embed="rId20" cstate="print"/>
+          <a:blip r:embed="rId21" cstate="print"/>
           <a:srcRect/>
           <a:stretch>
             <a:fillRect/>
@@ -5085,14 +5174,14 @@
           <p:cNvSpPr/>
           <p:nvPr userDrawn="1">
             <p:custDataLst>
-              <p:tags r:id="rId15"/>
+              <p:tags r:id="rId16"/>
             </p:custDataLst>
           </p:nvPr>
         </p:nvSpPr>
         <p:spPr>
           <a:xfrm>
-            <a:off x="7405897" y="6520036"/>
-            <a:ext cx="1357103" cy="240066"/>
+            <a:off x="7930120" y="6498264"/>
+            <a:ext cx="856260" cy="276999"/>
           </a:xfrm>
           <a:prstGeom prst="rect">
             <a:avLst/>
@@ -5116,26 +5205,6 @@
               </a:spcAft>
               <a:defRPr/>
             </a:pPr>
-            <a:r>
-              <a:rPr lang="en-US" sz="1200" b="1" dirty="0" smtClean="0">
-                <a:ln w="10541" cmpd="sng">
-                  <a:solidFill>
-                    <a:srgbClr val="7D7D7D">
-                      <a:tint val="100000"/>
-                      <a:shade val="100000"/>
-                      <a:satMod val="110000"/>
-                    </a:srgbClr>
-                  </a:solidFill>
-                  <a:prstDash val="solid"/>
-                </a:ln>
-                <a:solidFill>
-                  <a:srgbClr val="000000"/>
-                </a:solidFill>
-                <a:latin typeface="Calibri"/>
-                <a:cs typeface="Arial" charset="0"/>
-              </a:rPr>
-              <a:t>Multicore </a:t>
-            </a:r>
             <a:r>
               <a:rPr lang="en-US" sz="1200" b="1" dirty="0">
                 <a:ln w="10541" cmpd="sng">
@@ -5154,7 +5223,7 @@
                 <a:latin typeface="Calibri"/>
                 <a:cs typeface="Arial" charset="0"/>
               </a:rPr>
-              <a:t>Training</a:t>
+              <a:t>CI Training</a:t>
             </a:r>
           </a:p>
         </p:txBody>
@@ -5173,8 +5242,9 @@
     <p:sldLayoutId id="2147483686" r:id="rId8"/>
     <p:sldLayoutId id="2147483687" r:id="rId9"/>
     <p:sldLayoutId id="2147483690" r:id="rId10"/>
-    <p:sldLayoutId id="2147483692" r:id="rId11"/>
-    <p:sldLayoutId id="2147483693" r:id="rId12"/>
+    <p:sldLayoutId id="2147483691" r:id="rId11"/>
+    <p:sldLayoutId id="2147483692" r:id="rId12"/>
+    <p:sldLayoutId id="2147483693" r:id="rId13"/>
   </p:sldLayoutIdLst>
   <p:txStyles>
     <p:titleStyle>
@@ -5185,11 +5255,11 @@
         <a:buNone/>
         <a:defRPr sz="3600" b="1" kern="1200" baseline="0">
           <a:solidFill>
-            <a:schemeClr val="tx1"/>
+            <a:schemeClr val="tx2"/>
           </a:solidFill>
-          <a:latin typeface="Calibri" pitchFamily="34" charset="0"/>
+          <a:latin typeface="+mj-lt"/>
           <a:ea typeface="+mj-ea"/>
-          <a:cs typeface="Calibri" pitchFamily="34" charset="0"/>
+          <a:cs typeface="+mj-cs"/>
         </a:defRPr>
       </a:lvl1pPr>
     </p:titleStyle>
@@ -5198,85 +5268,95 @@
         <a:spcBef>
           <a:spcPct val="20000"/>
         </a:spcBef>
-        <a:buClrTx/>
-        <a:buSzPct val="100000"/>
-        <a:buFont typeface="Arial" pitchFamily="34" charset="0"/>
-        <a:buChar char="•"/>
+        <a:buClr>
+          <a:schemeClr val="tx2"/>
+        </a:buClr>
+        <a:buSzPct val="75000"/>
+        <a:buFont typeface="Wingdings" pitchFamily="2" charset="2"/>
+        <a:buChar char=""/>
         <a:defRPr sz="3200" b="1" kern="1200">
           <a:solidFill>
             <a:schemeClr val="tx1"/>
           </a:solidFill>
-          <a:latin typeface="Calibri" pitchFamily="34" charset="0"/>
+          <a:latin typeface="+mn-lt"/>
           <a:ea typeface="+mn-ea"/>
-          <a:cs typeface="Calibri" pitchFamily="34" charset="0"/>
+          <a:cs typeface="+mn-cs"/>
         </a:defRPr>
       </a:lvl1pPr>
       <a:lvl2pPr marL="742950" indent="-285750" algn="l" defTabSz="914400" rtl="0" eaLnBrk="1" latinLnBrk="0" hangingPunct="1">
         <a:spcBef>
           <a:spcPct val="20000"/>
         </a:spcBef>
-        <a:buClrTx/>
-        <a:buSzPct val="100000"/>
-        <a:buFont typeface="Courier New" pitchFamily="49" charset="0"/>
-        <a:buChar char="o"/>
+        <a:buClr>
+          <a:schemeClr val="tx2"/>
+        </a:buClr>
+        <a:buSzPct val="75000"/>
+        <a:buFont typeface="Wingdings" pitchFamily="2" charset="2"/>
+        <a:buChar char=""/>
         <a:defRPr sz="2800" b="1" kern="1200">
           <a:solidFill>
             <a:schemeClr val="tx1"/>
           </a:solidFill>
-          <a:latin typeface="Calibri" pitchFamily="34" charset="0"/>
+          <a:latin typeface="+mn-lt"/>
           <a:ea typeface="+mn-ea"/>
-          <a:cs typeface="Calibri" pitchFamily="34" charset="0"/>
+          <a:cs typeface="+mn-cs"/>
         </a:defRPr>
       </a:lvl2pPr>
       <a:lvl3pPr marL="1143000" indent="-228600" algn="l" defTabSz="914400" rtl="0" eaLnBrk="1" latinLnBrk="0" hangingPunct="1">
         <a:spcBef>
           <a:spcPct val="20000"/>
         </a:spcBef>
-        <a:buClrTx/>
-        <a:buSzPct val="100000"/>
+        <a:buClr>
+          <a:schemeClr val="tx2"/>
+        </a:buClr>
+        <a:buSzPct val="75000"/>
         <a:buFont typeface="Wingdings" pitchFamily="2" charset="2"/>
-        <a:buChar char="§"/>
+        <a:buChar char=""/>
         <a:defRPr sz="2400" b="1" kern="1200">
           <a:solidFill>
             <a:schemeClr val="tx1"/>
           </a:solidFill>
-          <a:latin typeface="Calibri" pitchFamily="34" charset="0"/>
+          <a:latin typeface="+mn-lt"/>
           <a:ea typeface="+mn-ea"/>
-          <a:cs typeface="Calibri" pitchFamily="34" charset="0"/>
+          <a:cs typeface="+mn-cs"/>
         </a:defRPr>
       </a:lvl3pPr>
       <a:lvl4pPr marL="1600200" indent="-228600" algn="l" defTabSz="914400" rtl="0" eaLnBrk="1" latinLnBrk="0" hangingPunct="1">
         <a:spcBef>
           <a:spcPct val="20000"/>
         </a:spcBef>
-        <a:buClrTx/>
-        <a:buSzPct val="100000"/>
-        <a:buFont typeface="Calibri" pitchFamily="34" charset="0"/>
-        <a:buChar char="―"/>
+        <a:buClr>
+          <a:schemeClr val="tx2"/>
+        </a:buClr>
+        <a:buSzPct val="75000"/>
+        <a:buFont typeface="Wingdings" pitchFamily="2" charset="2"/>
+        <a:buChar char=""/>
         <a:defRPr sz="2000" b="1" kern="1200">
           <a:solidFill>
             <a:schemeClr val="tx1"/>
           </a:solidFill>
-          <a:latin typeface="Calibri" pitchFamily="34" charset="0"/>
+          <a:latin typeface="+mn-lt"/>
           <a:ea typeface="+mn-ea"/>
-          <a:cs typeface="Calibri" pitchFamily="34" charset="0"/>
+          <a:cs typeface="+mn-cs"/>
         </a:defRPr>
       </a:lvl4pPr>
       <a:lvl5pPr marL="2057400" indent="-228600" algn="l" defTabSz="914400" rtl="0" eaLnBrk="1" latinLnBrk="0" hangingPunct="1">
         <a:spcBef>
           <a:spcPct val="20000"/>
         </a:spcBef>
-        <a:buClrTx/>
-        <a:buSzPct val="100000"/>
-        <a:buFont typeface="Arial" pitchFamily="34" charset="0"/>
-        <a:buChar char="•"/>
+        <a:buClr>
+          <a:schemeClr val="tx2"/>
+        </a:buClr>
+        <a:buSzPct val="75000"/>
+        <a:buFont typeface="Wingdings" pitchFamily="2" charset="2"/>
+        <a:buChar char=""/>
         <a:defRPr sz="2000" b="1" kern="1200">
           <a:solidFill>
             <a:schemeClr val="tx1"/>
           </a:solidFill>
-          <a:latin typeface="Calibri" pitchFamily="34" charset="0"/>
+          <a:latin typeface="+mn-lt"/>
           <a:ea typeface="+mn-ea"/>
-          <a:cs typeface="Calibri" pitchFamily="34" charset="0"/>
+          <a:cs typeface="+mn-cs"/>
         </a:defRPr>
       </a:lvl5pPr>
       <a:lvl6pPr marL="2514600" indent="-228600" algn="l" defTabSz="914400" rtl="0" eaLnBrk="1" latinLnBrk="0" hangingPunct="1">
@@ -5485,8 +5565,21 @@
                   <a:schemeClr val="tx1"/>
                 </a:solidFill>
               </a:rPr>
-              <a:t>Introduction to CCSv5</a:t>
-            </a:r>
+              <a:t>Introduction to </a:t>
+            </a:r>
+            <a:r>
+              <a:rPr lang="en-US" sz="4400" b="0" dirty="0" smtClean="0">
+                <a:solidFill>
+                  <a:schemeClr val="tx1"/>
+                </a:solidFill>
+              </a:rPr>
+              <a:t>CCSv5</a:t>
+            </a:r>
+            <a:endParaRPr lang="en-US" sz="4400" b="0" dirty="0" smtClean="0">
+              <a:solidFill>
+                <a:schemeClr val="tx1"/>
+              </a:solidFill>
+            </a:endParaRPr>
           </a:p>
         </p:txBody>
       </p:sp>
@@ -5526,39 +5619,6 @@
           <a:chExt cx="0" cy="0"/>
         </a:xfrm>
       </p:grpSpPr>
-      <p:sp>
-        <p:nvSpPr>
-          <p:cNvPr id="9" name="TextBox 8"/>
-          <p:cNvSpPr txBox="1"/>
-          <p:nvPr/>
-        </p:nvSpPr>
-        <p:spPr>
-          <a:xfrm>
-            <a:off x="228600" y="6430059"/>
-            <a:ext cx="8686800" cy="387798"/>
-          </a:xfrm>
-          <a:prstGeom prst="rect">
-            <a:avLst/>
-          </a:prstGeom>
-          <a:solidFill>
-            <a:schemeClr val="bg1"/>
-          </a:solidFill>
-        </p:spPr>
-        <p:txBody>
-          <a:bodyPr wrap="square" rtlCol="0" anchor="ctr" anchorCtr="0">
-            <a:spAutoFit/>
-          </a:bodyPr>
-          <a:lstStyle/>
-          <a:p>
-            <a:endParaRPr lang="en-US" dirty="0" smtClean="0">
-              <a:solidFill>
-                <a:schemeClr val="dk1"/>
-              </a:solidFill>
-              <a:effectLst/>
-            </a:endParaRPr>
-          </a:p>
-        </p:txBody>
-      </p:sp>
       <p:pic>
         <p:nvPicPr>
           <p:cNvPr id="1202178" name="Picture 2" descr="project example - gui2"/>
@@ -5616,7 +5676,7 @@
           <a:lstStyle/>
           <a:p>
             <a:r>
-              <a:rPr lang="en-US" dirty="0" smtClean="0"/>
+              <a:rPr lang="en-US" smtClean="0"/>
               <a:t>Eclipse “Projects”</a:t>
             </a:r>
           </a:p>
@@ -5664,8 +5724,8 @@
         </p:nvSpPr>
         <p:spPr bwMode="auto">
           <a:xfrm>
-            <a:off x="4191000" y="528638"/>
-            <a:ext cx="4857750" cy="2997744"/>
+            <a:off x="4419600" y="528638"/>
+            <a:ext cx="4629150" cy="2973387"/>
           </a:xfrm>
           <a:prstGeom prst="rect">
             <a:avLst/>
@@ -5679,7 +5739,7 @@
           </a:ln>
         </p:spPr>
         <p:txBody>
-          <a:bodyPr wrap="square">
+          <a:bodyPr>
             <a:spAutoFit/>
           </a:bodyPr>
           <a:lstStyle/>
@@ -5700,15 +5760,13 @@
             </a:pPr>
             <a:r>
               <a:rPr lang="en-US" sz="2000" dirty="0" smtClean="0">
-                <a:latin typeface="Calibri" pitchFamily="34" charset="0"/>
-                <a:cs typeface="Calibri" pitchFamily="34" charset="0"/>
+                <a:latin typeface="Arial Narrow" pitchFamily="34" charset="0"/>
               </a:rPr>
               <a:t>CCSv5 </a:t>
             </a:r>
             <a:r>
               <a:rPr lang="en-US" sz="2000" dirty="0">
-                <a:latin typeface="Calibri" pitchFamily="34" charset="0"/>
-                <a:cs typeface="Calibri" pitchFamily="34" charset="0"/>
+                <a:latin typeface="Arial Narrow" pitchFamily="34" charset="0"/>
               </a:rPr>
               <a:t>is PROJECT-centric</a:t>
             </a:r>
@@ -5730,8 +5788,7 @@
             </a:pPr>
             <a:r>
               <a:rPr lang="en-US" sz="2000" dirty="0">
-                <a:latin typeface="Calibri" pitchFamily="34" charset="0"/>
-                <a:cs typeface="Calibri" pitchFamily="34" charset="0"/>
+                <a:latin typeface="Arial Narrow" pitchFamily="34" charset="0"/>
               </a:rPr>
               <a:t>Eclipse uses </a:t>
             </a:r>
@@ -5740,15 +5797,13 @@
                 <a:solidFill>
                   <a:schemeClr val="tx2"/>
                 </a:solidFill>
-                <a:latin typeface="Calibri" pitchFamily="34" charset="0"/>
-                <a:cs typeface="Calibri" pitchFamily="34" charset="0"/>
+                <a:latin typeface="Arial Narrow" pitchFamily="34" charset="0"/>
               </a:rPr>
               <a:t>managed</a:t>
             </a:r>
             <a:r>
               <a:rPr lang="en-US" sz="2000" i="1" u="sng" dirty="0">
-                <a:latin typeface="Calibri" pitchFamily="34" charset="0"/>
-                <a:cs typeface="Calibri" pitchFamily="34" charset="0"/>
+                <a:latin typeface="Arial Narrow" pitchFamily="34" charset="0"/>
               </a:rPr>
               <a:t> </a:t>
             </a:r>
@@ -5757,29 +5812,25 @@
                 <a:solidFill>
                   <a:schemeClr val="tx2"/>
                 </a:solidFill>
-                <a:latin typeface="Calibri" pitchFamily="34" charset="0"/>
-                <a:cs typeface="Calibri" pitchFamily="34" charset="0"/>
+                <a:latin typeface="Arial Narrow" pitchFamily="34" charset="0"/>
               </a:rPr>
               <a:t>makefiles</a:t>
             </a:r>
             <a:r>
               <a:rPr lang="en-US" sz="2000" dirty="0">
-                <a:latin typeface="Calibri" pitchFamily="34" charset="0"/>
-                <a:cs typeface="Calibri" pitchFamily="34" charset="0"/>
+                <a:latin typeface="Arial Narrow" pitchFamily="34" charset="0"/>
               </a:rPr>
               <a:t> as their build scripts – as opposed to </a:t>
             </a:r>
             <a:r>
               <a:rPr lang="en-US" sz="2000" i="1" dirty="0" err="1">
-                <a:latin typeface="Calibri" pitchFamily="34" charset="0"/>
-                <a:cs typeface="Calibri" pitchFamily="34" charset="0"/>
+                <a:latin typeface="Arial Narrow" pitchFamily="34" charset="0"/>
               </a:rPr>
               <a:t>pjt</a:t>
             </a:r>
             <a:r>
               <a:rPr lang="en-US" sz="2000" dirty="0">
-                <a:latin typeface="Calibri" pitchFamily="34" charset="0"/>
-                <a:cs typeface="Calibri" pitchFamily="34" charset="0"/>
+                <a:latin typeface="Arial Narrow" pitchFamily="34" charset="0"/>
               </a:rPr>
               <a:t> files</a:t>
             </a:r>
@@ -5801,8 +5852,7 @@
             </a:pPr>
             <a:r>
               <a:rPr lang="en-US" sz="2000" dirty="0">
-                <a:latin typeface="Calibri" pitchFamily="34" charset="0"/>
-                <a:cs typeface="Calibri" pitchFamily="34" charset="0"/>
+                <a:latin typeface="Arial Narrow" pitchFamily="34" charset="0"/>
               </a:rPr>
               <a:t>Eclipse projects are folder based</a:t>
             </a:r>
@@ -5824,8 +5874,7 @@
             </a:pPr>
             <a:r>
               <a:rPr lang="en-US" sz="1800" b="0" dirty="0">
-                <a:latin typeface="Calibri" pitchFamily="34" charset="0"/>
-                <a:cs typeface="Calibri" pitchFamily="34" charset="0"/>
+                <a:latin typeface="Arial Narrow" pitchFamily="34" charset="0"/>
               </a:rPr>
               <a:t>“Adding file” copies it to folder</a:t>
             </a:r>
@@ -5847,8 +5896,7 @@
             </a:pPr>
             <a:r>
               <a:rPr lang="en-US" sz="1800" b="0" dirty="0">
-                <a:latin typeface="Calibri" pitchFamily="34" charset="0"/>
-                <a:cs typeface="Calibri" pitchFamily="34" charset="0"/>
+                <a:latin typeface="Arial Narrow" pitchFamily="34" charset="0"/>
               </a:rPr>
               <a:t>“Linking file” references original file</a:t>
             </a:r>
@@ -5870,8 +5918,7 @@
             </a:pPr>
             <a:r>
               <a:rPr lang="en-US" sz="1800" b="0" dirty="0">
-                <a:latin typeface="Calibri" pitchFamily="34" charset="0"/>
-                <a:cs typeface="Calibri" pitchFamily="34" charset="0"/>
+                <a:latin typeface="Arial Narrow" pitchFamily="34" charset="0"/>
               </a:rPr>
               <a:t>Project explorer shows folder contents</a:t>
             </a:r>
@@ -5893,8 +5940,7 @@
             </a:pPr>
             <a:r>
               <a:rPr lang="en-US" sz="2000" dirty="0">
-                <a:latin typeface="Calibri" pitchFamily="34" charset="0"/>
-                <a:cs typeface="Calibri" pitchFamily="34" charset="0"/>
+                <a:latin typeface="Arial Narrow" pitchFamily="34" charset="0"/>
               </a:rPr>
               <a:t>Project explorer lists functions</a:t>
             </a:r>
@@ -5999,8 +6045,8 @@
         </p:nvSpPr>
         <p:spPr bwMode="auto">
           <a:xfrm>
-            <a:off x="965898" y="5978402"/>
-            <a:ext cx="1884555" cy="498598"/>
+            <a:off x="1066800" y="5984875"/>
+            <a:ext cx="1682750" cy="492125"/>
           </a:xfrm>
           <a:prstGeom prst="rect">
             <a:avLst/>
@@ -6025,31 +6071,28 @@
               </a:spcBef>
             </a:pPr>
             <a:r>
-              <a:rPr lang="en-US" sz="2000" b="0" dirty="0">
+              <a:rPr lang="en-US" sz="2000" b="0">
                 <a:solidFill>
                   <a:schemeClr val="tx2"/>
                 </a:solidFill>
-                <a:latin typeface="Calibri" pitchFamily="34" charset="0"/>
-                <a:cs typeface="Calibri" pitchFamily="34" charset="0"/>
+                <a:latin typeface="Arial Narrow" pitchFamily="34" charset="0"/>
               </a:rPr>
               <a:t>How do we create</a:t>
             </a:r>
             <a:br>
-              <a:rPr lang="en-US" sz="2000" b="0" dirty="0">
+              <a:rPr lang="en-US" sz="2000" b="0">
                 <a:solidFill>
                   <a:schemeClr val="tx2"/>
                 </a:solidFill>
-                <a:latin typeface="Calibri" pitchFamily="34" charset="0"/>
-                <a:cs typeface="Calibri" pitchFamily="34" charset="0"/>
+                <a:latin typeface="Arial Narrow" pitchFamily="34" charset="0"/>
               </a:rPr>
             </a:br>
             <a:r>
-              <a:rPr lang="en-US" sz="2000" b="0" dirty="0">
+              <a:rPr lang="en-US" sz="2000" b="0">
                 <a:solidFill>
                   <a:schemeClr val="tx2"/>
                 </a:solidFill>
-                <a:latin typeface="Calibri" pitchFamily="34" charset="0"/>
-                <a:cs typeface="Calibri" pitchFamily="34" charset="0"/>
+                <a:latin typeface="Arial Narrow" pitchFamily="34" charset="0"/>
               </a:rPr>
               <a:t>a NEW project?</a:t>
             </a:r>
@@ -6160,39 +6203,6 @@
           <a:chExt cx="0" cy="0"/>
         </a:xfrm>
       </p:grpSpPr>
-      <p:sp>
-        <p:nvSpPr>
-          <p:cNvPr id="11" name="TextBox 10"/>
-          <p:cNvSpPr txBox="1"/>
-          <p:nvPr/>
-        </p:nvSpPr>
-        <p:spPr>
-          <a:xfrm>
-            <a:off x="228600" y="6440945"/>
-            <a:ext cx="8686800" cy="387798"/>
-          </a:xfrm>
-          <a:prstGeom prst="rect">
-            <a:avLst/>
-          </a:prstGeom>
-          <a:solidFill>
-            <a:schemeClr val="bg1"/>
-          </a:solidFill>
-        </p:spPr>
-        <p:txBody>
-          <a:bodyPr wrap="square" rtlCol="0" anchor="ctr" anchorCtr="0">
-            <a:spAutoFit/>
-          </a:bodyPr>
-          <a:lstStyle/>
-          <a:p>
-            <a:endParaRPr lang="en-US" dirty="0" smtClean="0">
-              <a:solidFill>
-                <a:schemeClr val="dk1"/>
-              </a:solidFill>
-              <a:effectLst/>
-            </a:endParaRPr>
-          </a:p>
-        </p:txBody>
-      </p:sp>
       <p:sp>
         <p:nvSpPr>
           <p:cNvPr id="14338" name="Rectangle 2"/>
@@ -6422,7 +6432,7 @@
         <p:spPr bwMode="auto">
           <a:xfrm>
             <a:off x="4173538" y="700088"/>
-            <a:ext cx="2047612" cy="319446"/>
+            <a:ext cx="2262187" cy="312737"/>
           </a:xfrm>
           <a:prstGeom prst="rect">
             <a:avLst/>
@@ -6442,10 +6452,7 @@
           <a:lstStyle/>
           <a:p>
             <a:r>
-              <a:rPr lang="en-US" sz="1800" b="0" dirty="0">
-                <a:latin typeface="Calibri" pitchFamily="34" charset="0"/>
-                <a:cs typeface="Calibri" pitchFamily="34" charset="0"/>
-              </a:rPr>
+              <a:rPr lang="en-US" sz="1800" b="0"/>
               <a:t>(in C++ perspective)</a:t>
             </a:r>
           </a:p>
@@ -6468,8 +6475,8 @@
         </p:blipFill>
         <p:spPr bwMode="auto">
           <a:xfrm>
-            <a:off x="1354270" y="1209674"/>
-            <a:ext cx="6113330" cy="5495926"/>
+            <a:off x="1447800" y="1219200"/>
+            <a:ext cx="5753100" cy="5172075"/>
           </a:xfrm>
           <a:prstGeom prst="rect">
             <a:avLst/>
@@ -6518,39 +6525,6 @@
       </p:grpSpPr>
       <p:sp>
         <p:nvSpPr>
-          <p:cNvPr id="5" name="TextBox 4"/>
-          <p:cNvSpPr txBox="1"/>
-          <p:nvPr/>
-        </p:nvSpPr>
-        <p:spPr>
-          <a:xfrm>
-            <a:off x="228600" y="6440945"/>
-            <a:ext cx="8686800" cy="387798"/>
-          </a:xfrm>
-          <a:prstGeom prst="rect">
-            <a:avLst/>
-          </a:prstGeom>
-          <a:solidFill>
-            <a:schemeClr val="bg1"/>
-          </a:solidFill>
-        </p:spPr>
-        <p:txBody>
-          <a:bodyPr wrap="square" rtlCol="0" anchor="ctr" anchorCtr="0">
-            <a:spAutoFit/>
-          </a:bodyPr>
-          <a:lstStyle/>
-          <a:p>
-            <a:endParaRPr lang="en-US" dirty="0" smtClean="0">
-              <a:solidFill>
-                <a:schemeClr val="dk1"/>
-              </a:solidFill>
-              <a:effectLst/>
-            </a:endParaRPr>
-          </a:p>
-        </p:txBody>
-      </p:sp>
-      <p:sp>
-        <p:nvSpPr>
           <p:cNvPr id="14338" name="Rectangle 2"/>
           <p:cNvSpPr>
             <a:spLocks noGrp="1" noChangeArrowheads="1"/>
@@ -6622,8 +6596,8 @@
         </p:blipFill>
         <p:spPr bwMode="auto">
           <a:xfrm>
-            <a:off x="1981201" y="609600"/>
-            <a:ext cx="5305424" cy="6098596"/>
+            <a:off x="2209800" y="685800"/>
+            <a:ext cx="4848225" cy="5573043"/>
           </a:xfrm>
           <a:prstGeom prst="rect">
             <a:avLst/>
@@ -6672,39 +6646,6 @@
       </p:grpSpPr>
       <p:sp>
         <p:nvSpPr>
-          <p:cNvPr id="6" name="TextBox 5"/>
-          <p:cNvSpPr txBox="1"/>
-          <p:nvPr/>
-        </p:nvSpPr>
-        <p:spPr>
-          <a:xfrm>
-            <a:off x="228600" y="6430059"/>
-            <a:ext cx="8686800" cy="387798"/>
-          </a:xfrm>
-          <a:prstGeom prst="rect">
-            <a:avLst/>
-          </a:prstGeom>
-          <a:solidFill>
-            <a:schemeClr val="bg1"/>
-          </a:solidFill>
-        </p:spPr>
-        <p:txBody>
-          <a:bodyPr wrap="square" rtlCol="0" anchor="ctr" anchorCtr="0">
-            <a:spAutoFit/>
-          </a:bodyPr>
-          <a:lstStyle/>
-          <a:p>
-            <a:endParaRPr lang="en-US" dirty="0" smtClean="0">
-              <a:solidFill>
-                <a:schemeClr val="dk1"/>
-              </a:solidFill>
-              <a:effectLst/>
-            </a:endParaRPr>
-          </a:p>
-        </p:txBody>
-      </p:sp>
-      <p:sp>
-        <p:nvSpPr>
           <p:cNvPr id="14338" name="Rectangle 2"/>
           <p:cNvSpPr>
             <a:spLocks noGrp="1" noChangeArrowheads="1"/>
@@ -6776,8 +6717,8 @@
         </p:blipFill>
         <p:spPr bwMode="auto">
           <a:xfrm>
-            <a:off x="76200" y="710560"/>
-            <a:ext cx="5129214" cy="5690620"/>
+            <a:off x="152400" y="990600"/>
+            <a:ext cx="4624387" cy="5130539"/>
           </a:xfrm>
           <a:prstGeom prst="rect">
             <a:avLst/>
@@ -6799,8 +6740,8 @@
         </p:nvSpPr>
         <p:spPr>
           <a:xfrm>
-            <a:off x="5257800" y="1371600"/>
-            <a:ext cx="3886200" cy="2862322"/>
+            <a:off x="5029200" y="1371600"/>
+            <a:ext cx="4114800" cy="2492990"/>
           </a:xfrm>
           <a:prstGeom prst="rect">
             <a:avLst/>
@@ -6822,19 +6763,30 @@
               <a:spcAft>
                 <a:spcPct val="30000"/>
               </a:spcAft>
+              <a:buClr>
+                <a:schemeClr val="tx2"/>
+              </a:buClr>
               <a:buSzPct val="95000"/>
-              <a:buFont typeface="Arial" pitchFamily="34" charset="0"/>
-              <a:buChar char="•"/>
+              <a:buFont typeface="Wingdings" pitchFamily="2" charset="2"/>
+              <a:buChar char="Ø"/>
               <a:tabLst>
                 <a:tab pos="1946275" algn="l"/>
               </a:tabLst>
             </a:pPr>
             <a:r>
               <a:rPr lang="en-US" sz="2800" dirty="0" smtClean="0">
-                <a:latin typeface="Calibri" pitchFamily="34" charset="0"/>
-                <a:cs typeface="Calibri" pitchFamily="34" charset="0"/>
+                <a:solidFill>
+                  <a:schemeClr val="tx2"/>
+                </a:solidFill>
+                <a:latin typeface="Arial Narrow" pitchFamily="34" charset="0"/>
               </a:rPr>
-              <a:t>Not using SYS/BIOS?	 </a:t>
+              <a:t>Not using SYS/BIOS?</a:t>
+            </a:r>
+            <a:r>
+              <a:rPr lang="en-US" sz="2800" dirty="0" smtClean="0">
+                <a:latin typeface="Arial Narrow" pitchFamily="34" charset="0"/>
+              </a:rPr>
+              <a:t>	 </a:t>
             </a:r>
           </a:p>
           <a:p>
@@ -6848,17 +6800,19 @@
               <a:spcAft>
                 <a:spcPct val="30000"/>
               </a:spcAft>
+              <a:buClr>
+                <a:schemeClr val="tx2"/>
+              </a:buClr>
               <a:buSzPct val="95000"/>
-              <a:buFont typeface="Courier New" pitchFamily="49" charset="0"/>
-              <a:buChar char="o"/>
+              <a:buFont typeface="Wingdings" pitchFamily="2" charset="2"/>
+              <a:buChar char="Ø"/>
               <a:tabLst>
                 <a:tab pos="1946275" algn="l"/>
               </a:tabLst>
             </a:pPr>
             <a:r>
               <a:rPr lang="en-US" dirty="0" smtClean="0">
-                <a:latin typeface="Calibri" pitchFamily="34" charset="0"/>
-                <a:cs typeface="Calibri" pitchFamily="34" charset="0"/>
+                <a:latin typeface="Arial Narrow" pitchFamily="34" charset="0"/>
               </a:rPr>
               <a:t>Choose “Empty Project” </a:t>
             </a:r>
@@ -6874,19 +6828,30 @@
               <a:spcAft>
                 <a:spcPct val="30000"/>
               </a:spcAft>
+              <a:buClr>
+                <a:schemeClr val="tx2"/>
+              </a:buClr>
               <a:buSzPct val="95000"/>
-              <a:buFont typeface="Arial" pitchFamily="34" charset="0"/>
-              <a:buChar char="•"/>
+              <a:buFont typeface="Wingdings" pitchFamily="2" charset="2"/>
+              <a:buChar char="Ø"/>
               <a:tabLst>
                 <a:tab pos="1946275" algn="l"/>
               </a:tabLst>
             </a:pPr>
             <a:r>
               <a:rPr lang="en-US" sz="2800" dirty="0" smtClean="0">
-                <a:latin typeface="Calibri" pitchFamily="34" charset="0"/>
-                <a:cs typeface="Calibri" pitchFamily="34" charset="0"/>
+                <a:solidFill>
+                  <a:schemeClr val="tx2"/>
+                </a:solidFill>
+                <a:latin typeface="Arial Narrow" pitchFamily="34" charset="0"/>
               </a:rPr>
-              <a:t>Using SYS/BIOS?	</a:t>
+              <a:t>Using SYS/BIOS?</a:t>
+            </a:r>
+            <a:r>
+              <a:rPr lang="en-US" sz="2800" dirty="0" smtClean="0">
+                <a:latin typeface="Arial Narrow" pitchFamily="34" charset="0"/>
+              </a:rPr>
+              <a:t>	</a:t>
             </a:r>
           </a:p>
           <a:p>
@@ -6900,30 +6865,30 @@
               <a:spcAft>
                 <a:spcPct val="30000"/>
               </a:spcAft>
+              <a:buClr>
+                <a:schemeClr val="tx2"/>
+              </a:buClr>
               <a:buSzPct val="95000"/>
-              <a:buFont typeface="Courier New" pitchFamily="49" charset="0"/>
-              <a:buChar char="o"/>
+              <a:buFont typeface="Wingdings" pitchFamily="2" charset="2"/>
+              <a:buChar char="Ø"/>
               <a:tabLst>
                 <a:tab pos="1946275" algn="l"/>
               </a:tabLst>
             </a:pPr>
             <a:r>
               <a:rPr lang="en-US" sz="2800" dirty="0" smtClean="0">
-                <a:latin typeface="Calibri" pitchFamily="34" charset="0"/>
-                <a:cs typeface="Calibri" pitchFamily="34" charset="0"/>
+                <a:latin typeface="Arial Narrow" pitchFamily="34" charset="0"/>
               </a:rPr>
               <a:t> </a:t>
             </a:r>
             <a:r>
               <a:rPr lang="en-US" dirty="0" smtClean="0">
-                <a:latin typeface="Calibri" pitchFamily="34" charset="0"/>
-                <a:cs typeface="Calibri" pitchFamily="34" charset="0"/>
+                <a:latin typeface="Arial Narrow" pitchFamily="34" charset="0"/>
               </a:rPr>
               <a:t>Choose “Minimal” under SYS/BIOS</a:t>
             </a:r>
             <a:endParaRPr lang="en-US" b="0" i="1" dirty="0">
-              <a:latin typeface="Calibri" pitchFamily="34" charset="0"/>
-              <a:cs typeface="Calibri" pitchFamily="34" charset="0"/>
+              <a:latin typeface="Arial Narrow" pitchFamily="34" charset="0"/>
             </a:endParaRPr>
           </a:p>
         </p:txBody>
@@ -6961,39 +6926,6 @@
           <a:chExt cx="0" cy="0"/>
         </a:xfrm>
       </p:grpSpPr>
-      <p:sp>
-        <p:nvSpPr>
-          <p:cNvPr id="9" name="TextBox 8"/>
-          <p:cNvSpPr txBox="1"/>
-          <p:nvPr/>
-        </p:nvSpPr>
-        <p:spPr>
-          <a:xfrm>
-            <a:off x="228600" y="6430059"/>
-            <a:ext cx="8686800" cy="387798"/>
-          </a:xfrm>
-          <a:prstGeom prst="rect">
-            <a:avLst/>
-          </a:prstGeom>
-          <a:solidFill>
-            <a:schemeClr val="bg1"/>
-          </a:solidFill>
-        </p:spPr>
-        <p:txBody>
-          <a:bodyPr wrap="square" rtlCol="0" anchor="ctr" anchorCtr="0">
-            <a:spAutoFit/>
-          </a:bodyPr>
-          <a:lstStyle/>
-          <a:p>
-            <a:endParaRPr lang="en-US" dirty="0" smtClean="0">
-              <a:solidFill>
-                <a:schemeClr val="dk1"/>
-              </a:solidFill>
-              <a:effectLst/>
-            </a:endParaRPr>
-          </a:p>
-        </p:txBody>
-      </p:sp>
       <p:pic>
         <p:nvPicPr>
           <p:cNvPr id="5122" name="Picture 2"/>
@@ -7104,7 +7036,7 @@
         <p:spPr bwMode="auto">
           <a:xfrm>
             <a:off x="228600" y="600075"/>
-            <a:ext cx="7225376" cy="1274195"/>
+            <a:ext cx="8270875" cy="1274763"/>
           </a:xfrm>
           <a:prstGeom prst="rect">
             <a:avLst/>
@@ -7135,44 +7067,18 @@
               <a:buChar char=""/>
             </a:pPr>
             <a:r>
-              <a:rPr lang="en-US" i="1" u="sng" dirty="0">
-                <a:latin typeface="Calibri" pitchFamily="34" charset="0"/>
-                <a:cs typeface="Calibri" pitchFamily="34" charset="0"/>
-              </a:rPr>
+              <a:rPr lang="en-US" i="1" u="sng"/>
               <a:t>Workspace</a:t>
             </a:r>
             <a:r>
-              <a:rPr lang="en-US" dirty="0">
-                <a:latin typeface="Calibri" pitchFamily="34" charset="0"/>
-                <a:cs typeface="Calibri" pitchFamily="34" charset="0"/>
-              </a:rPr>
-              <a:t> –  </a:t>
-            </a:r>
-            <a:r>
-              <a:rPr lang="en-US" dirty="0" smtClean="0">
-                <a:latin typeface="Calibri" pitchFamily="34" charset="0"/>
-                <a:cs typeface="Calibri" pitchFamily="34" charset="0"/>
-              </a:rPr>
-              <a:t>A </a:t>
-            </a:r>
-            <a:r>
-              <a:rPr lang="en-US" dirty="0">
-                <a:latin typeface="Calibri" pitchFamily="34" charset="0"/>
-                <a:cs typeface="Calibri" pitchFamily="34" charset="0"/>
-              </a:rPr>
-              <a:t>“container” for Eclipse metadata and</a:t>
+              <a:rPr lang="en-US"/>
+              <a:t> –  a “container” for Eclipse metadata and</a:t>
             </a:r>
             <a:br>
-              <a:rPr lang="en-US" dirty="0">
-                <a:latin typeface="Calibri" pitchFamily="34" charset="0"/>
-                <a:cs typeface="Calibri" pitchFamily="34" charset="0"/>
-              </a:rPr>
+              <a:rPr lang="en-US"/>
             </a:br>
             <a:r>
-              <a:rPr lang="en-US" dirty="0">
-                <a:latin typeface="Calibri" pitchFamily="34" charset="0"/>
-                <a:cs typeface="Calibri" pitchFamily="34" charset="0"/>
-              </a:rPr>
+              <a:rPr lang="en-US"/>
               <a:t>the default location for all projects</a:t>
             </a:r>
           </a:p>
@@ -7189,11 +7095,19 @@
               <a:buChar char=""/>
             </a:pPr>
             <a:r>
-              <a:rPr lang="en-US" dirty="0">
-                <a:latin typeface="Calibri" pitchFamily="34" charset="0"/>
-                <a:cs typeface="Calibri" pitchFamily="34" charset="0"/>
+              <a:rPr lang="en-US"/>
+              <a:t>Default Location: </a:t>
+            </a:r>
+            <a:r>
+              <a:rPr lang="en-US">
+                <a:latin typeface="Courier New" pitchFamily="49" charset="0"/>
+                <a:cs typeface="Courier New" pitchFamily="49" charset="0"/>
               </a:rPr>
-              <a:t>Default Location: \My Documents\workspace:</a:t>
+              <a:t>\My Documents\workspace</a:t>
+            </a:r>
+            <a:r>
+              <a:rPr lang="en-US"/>
+              <a:t>:</a:t>
             </a:r>
           </a:p>
         </p:txBody>
@@ -7209,7 +7123,7 @@
         <p:spPr bwMode="auto">
           <a:xfrm>
             <a:off x="228600" y="3581400"/>
-            <a:ext cx="7029168" cy="941796"/>
+            <a:ext cx="8067675" cy="941388"/>
           </a:xfrm>
           <a:prstGeom prst="rect">
             <a:avLst/>
@@ -7240,10 +7154,7 @@
               <a:buChar char=""/>
             </a:pPr>
             <a:r>
-              <a:rPr lang="en-US">
-                <a:latin typeface="Calibri" pitchFamily="34" charset="0"/>
-                <a:cs typeface="Calibri" pitchFamily="34" charset="0"/>
-              </a:rPr>
+              <a:rPr lang="en-US"/>
               <a:t>Can change “default” workspace location if desired</a:t>
             </a:r>
           </a:p>
@@ -7260,10 +7171,7 @@
               <a:buChar char=""/>
             </a:pPr>
             <a:r>
-              <a:rPr lang="en-US">
-                <a:latin typeface="Calibri" pitchFamily="34" charset="0"/>
-                <a:cs typeface="Calibri" pitchFamily="34" charset="0"/>
-              </a:rPr>
+              <a:rPr lang="en-US"/>
               <a:t>User can also locate projects in specific folders:</a:t>
             </a:r>
           </a:p>
@@ -8124,39 +8032,6 @@
           <a:chExt cx="0" cy="0"/>
         </a:xfrm>
       </p:grpSpPr>
-      <p:sp>
-        <p:nvSpPr>
-          <p:cNvPr id="15" name="TextBox 14"/>
-          <p:cNvSpPr txBox="1"/>
-          <p:nvPr/>
-        </p:nvSpPr>
-        <p:spPr>
-          <a:xfrm>
-            <a:off x="228600" y="6430059"/>
-            <a:ext cx="8686800" cy="387798"/>
-          </a:xfrm>
-          <a:prstGeom prst="rect">
-            <a:avLst/>
-          </a:prstGeom>
-          <a:solidFill>
-            <a:schemeClr val="bg1"/>
-          </a:solidFill>
-        </p:spPr>
-        <p:txBody>
-          <a:bodyPr wrap="square" rtlCol="0" anchor="ctr" anchorCtr="0">
-            <a:spAutoFit/>
-          </a:bodyPr>
-          <a:lstStyle/>
-          <a:p>
-            <a:endParaRPr lang="en-US" dirty="0" smtClean="0">
-              <a:solidFill>
-                <a:schemeClr val="dk1"/>
-              </a:solidFill>
-              <a:effectLst/>
-            </a:endParaRPr>
-          </a:p>
-        </p:txBody>
-      </p:sp>
       <p:pic>
         <p:nvPicPr>
           <p:cNvPr id="6148" name="Picture 4"/>
@@ -8285,17 +8160,11 @@
               <a:buChar char=""/>
             </a:pPr>
             <a:r>
-              <a:rPr lang="en-US" sz="2000" i="1" u="sng" dirty="0">
-                <a:latin typeface="Calibri" pitchFamily="34" charset="0"/>
-                <a:cs typeface="Calibri" pitchFamily="34" charset="0"/>
-              </a:rPr>
+              <a:rPr lang="en-US" sz="2000" i="1" u="sng"/>
               <a:t>Target Configuration</a:t>
             </a:r>
             <a:r>
-              <a:rPr lang="en-US" sz="2000" dirty="0">
-                <a:latin typeface="Calibri" pitchFamily="34" charset="0"/>
-                <a:cs typeface="Calibri" pitchFamily="34" charset="0"/>
-              </a:rPr>
+              <a:rPr lang="en-US" sz="2000"/>
               <a:t> –  defines your “target” – i.e. emulator/device used, GEL scripts (replaces the old CCS Setup)</a:t>
             </a:r>
           </a:p>
@@ -8312,10 +8181,7 @@
               <a:buChar char=""/>
             </a:pPr>
             <a:r>
-              <a:rPr lang="en-US" sz="2000" dirty="0">
-                <a:latin typeface="Calibri" pitchFamily="34" charset="0"/>
-                <a:cs typeface="Calibri" pitchFamily="34" charset="0"/>
-              </a:rPr>
+              <a:rPr lang="en-US" sz="2000"/>
               <a:t>Use on a per-project basis (add to project or create User Defined) </a:t>
             </a:r>
           </a:p>
@@ -8332,7 +8198,7 @@
         <p:spPr bwMode="auto">
           <a:xfrm>
             <a:off x="6477000" y="2590800"/>
-            <a:ext cx="861711" cy="344710"/>
+            <a:ext cx="1014413" cy="349250"/>
           </a:xfrm>
           <a:prstGeom prst="rect">
             <a:avLst/>
@@ -8360,8 +8226,6 @@
                 <a:solidFill>
                   <a:schemeClr val="tx2"/>
                 </a:solidFill>
-                <a:latin typeface="Calibri" pitchFamily="34" charset="0"/>
-                <a:cs typeface="Calibri" pitchFamily="34" charset="0"/>
               </a:rPr>
               <a:t>“click”</a:t>
             </a:r>
@@ -8410,8 +8274,6 @@
                   </a:srgbClr>
                 </a:outerShdw>
               </a:effectLst>
-              <a:latin typeface="Calibri" pitchFamily="34" charset="0"/>
-              <a:cs typeface="Calibri" pitchFamily="34" charset="0"/>
             </a:endParaRPr>
           </a:p>
         </p:txBody>
@@ -8427,7 +8289,7 @@
         <p:spPr bwMode="auto">
           <a:xfrm>
             <a:off x="5029200" y="6292850"/>
-            <a:ext cx="2594556" cy="344710"/>
+            <a:ext cx="3059113" cy="349250"/>
           </a:xfrm>
           <a:prstGeom prst="rect">
             <a:avLst/>
@@ -8455,8 +8317,6 @@
                 <a:solidFill>
                   <a:schemeClr val="tx2"/>
                 </a:solidFill>
-                <a:latin typeface="Calibri" pitchFamily="34" charset="0"/>
-                <a:cs typeface="Calibri" pitchFamily="34" charset="0"/>
               </a:rPr>
               <a:t>Specify GEL script here</a:t>
             </a:r>
@@ -8505,8 +8365,6 @@
                   </a:srgbClr>
                 </a:outerShdw>
               </a:effectLst>
-              <a:latin typeface="Calibri" pitchFamily="34" charset="0"/>
-              <a:cs typeface="Calibri" pitchFamily="34" charset="0"/>
             </a:endParaRPr>
           </a:p>
         </p:txBody>
@@ -8553,8 +8411,6 @@
                   </a:srgbClr>
                 </a:outerShdw>
               </a:effectLst>
-              <a:latin typeface="Calibri" pitchFamily="34" charset="0"/>
-              <a:cs typeface="Calibri" pitchFamily="34" charset="0"/>
             </a:endParaRPr>
           </a:p>
         </p:txBody>
@@ -8594,8 +8450,7 @@
             <a:pPr algn="ctr"/>
             <a:r>
               <a:rPr lang="en-US" sz="1800">
-                <a:latin typeface="Calibri" pitchFamily="34" charset="0"/>
-                <a:cs typeface="Calibri" pitchFamily="34" charset="0"/>
+                <a:latin typeface="Arial Narrow" pitchFamily="34" charset="0"/>
               </a:rPr>
               <a:t>Advanced Tab</a:t>
             </a:r>
@@ -8649,8 +8504,6 @@
                   </a:srgbClr>
                 </a:outerShdw>
               </a:effectLst>
-              <a:latin typeface="Calibri" pitchFamily="34" charset="0"/>
-              <a:cs typeface="Calibri" pitchFamily="34" charset="0"/>
             </a:endParaRPr>
           </a:p>
         </p:txBody>
@@ -8729,8 +8582,6 @@
                   </a:srgbClr>
                 </a:outerShdw>
               </a:effectLst>
-              <a:latin typeface="Calibri" pitchFamily="34" charset="0"/>
-              <a:cs typeface="Calibri" pitchFamily="34" charset="0"/>
             </a:endParaRPr>
           </a:p>
         </p:txBody>
@@ -8930,8 +8781,6 @@
                 <a:solidFill>
                   <a:srgbClr val="000000"/>
                 </a:solidFill>
-                <a:latin typeface="Calibri" pitchFamily="34" charset="0"/>
-                <a:cs typeface="Calibri" pitchFamily="34" charset="0"/>
               </a:rPr>
               <a:t>Intro to CCSv5</a:t>
             </a:r>
@@ -8939,8 +8788,6 @@
               <a:solidFill>
                 <a:srgbClr val="000000"/>
               </a:solidFill>
-              <a:latin typeface="Calibri" pitchFamily="34" charset="0"/>
-              <a:cs typeface="Calibri" pitchFamily="34" charset="0"/>
             </a:endParaRPr>
           </a:p>
         </p:txBody>
@@ -8996,12 +8843,10 @@
               <a:buChar char=""/>
             </a:pPr>
             <a:r>
-              <a:rPr lang="en-US" dirty="0" smtClean="0">
+              <a:rPr lang="en-US" smtClean="0">
                 <a:solidFill>
                   <a:srgbClr val="000000"/>
                 </a:solidFill>
-                <a:latin typeface="Calibri" pitchFamily="34" charset="0"/>
-                <a:cs typeface="Calibri" pitchFamily="34" charset="0"/>
               </a:rPr>
               <a:t>Functional Overview</a:t>
             </a:r>
@@ -9009,8 +8854,6 @@
               <a:solidFill>
                 <a:srgbClr val="000000"/>
               </a:solidFill>
-              <a:latin typeface="Calibri" pitchFamily="34" charset="0"/>
-              <a:cs typeface="Calibri" pitchFamily="34" charset="0"/>
             </a:endParaRPr>
           </a:p>
         </p:txBody>
@@ -9070,8 +8913,6 @@
                 <a:solidFill>
                   <a:srgbClr val="000000"/>
                 </a:solidFill>
-                <a:latin typeface="Calibri" pitchFamily="34" charset="0"/>
-                <a:cs typeface="Calibri" pitchFamily="34" charset="0"/>
               </a:rPr>
               <a:t>Perspectives</a:t>
             </a:r>
@@ -9079,8 +8920,6 @@
               <a:solidFill>
                 <a:srgbClr val="000000"/>
               </a:solidFill>
-              <a:latin typeface="Calibri" pitchFamily="34" charset="0"/>
-              <a:cs typeface="Calibri" pitchFamily="34" charset="0"/>
             </a:endParaRPr>
           </a:p>
         </p:txBody>
@@ -9140,8 +8979,6 @@
                 <a:solidFill>
                   <a:srgbClr val="000000"/>
                 </a:solidFill>
-                <a:latin typeface="Calibri" pitchFamily="34" charset="0"/>
-                <a:cs typeface="Calibri" pitchFamily="34" charset="0"/>
               </a:rPr>
               <a:t>Projects</a:t>
             </a:r>
@@ -9149,8 +8986,6 @@
               <a:solidFill>
                 <a:srgbClr val="000000"/>
               </a:solidFill>
-              <a:latin typeface="Calibri" pitchFamily="34" charset="0"/>
-              <a:cs typeface="Calibri" pitchFamily="34" charset="0"/>
             </a:endParaRPr>
           </a:p>
         </p:txBody>
@@ -9210,8 +9045,6 @@
                 <a:solidFill>
                   <a:srgbClr val="000000"/>
                 </a:solidFill>
-                <a:latin typeface="Calibri" pitchFamily="34" charset="0"/>
-                <a:cs typeface="Calibri" pitchFamily="34" charset="0"/>
               </a:rPr>
               <a:t>Target Configuration</a:t>
             </a:r>
@@ -9219,8 +9052,6 @@
               <a:solidFill>
                 <a:srgbClr val="000000"/>
               </a:solidFill>
-              <a:latin typeface="Calibri" pitchFamily="34" charset="0"/>
-              <a:cs typeface="Calibri" pitchFamily="34" charset="0"/>
             </a:endParaRPr>
           </a:p>
         </p:txBody>
@@ -9284,8 +9115,6 @@
                 <a:solidFill>
                   <a:srgbClr val="000000"/>
                 </a:solidFill>
-                <a:latin typeface="Calibri" pitchFamily="34" charset="0"/>
-                <a:cs typeface="Calibri" pitchFamily="34" charset="0"/>
               </a:rPr>
               <a:t>Build Config &amp; Options</a:t>
             </a:r>
@@ -9293,8 +9122,6 @@
               <a:solidFill>
                 <a:srgbClr val="000000"/>
               </a:solidFill>
-              <a:latin typeface="Calibri" pitchFamily="34" charset="0"/>
-              <a:cs typeface="Calibri" pitchFamily="34" charset="0"/>
             </a:endParaRPr>
           </a:p>
         </p:txBody>
@@ -9354,8 +9181,6 @@
                 <a:solidFill>
                   <a:srgbClr val="000000"/>
                 </a:solidFill>
-                <a:latin typeface="Calibri" pitchFamily="34" charset="0"/>
-                <a:cs typeface="Calibri" pitchFamily="34" charset="0"/>
               </a:rPr>
               <a:t>Licensing/Pricing</a:t>
             </a:r>
@@ -9363,8 +9188,6 @@
               <a:solidFill>
                 <a:srgbClr val="000000"/>
               </a:solidFill>
-              <a:latin typeface="Calibri" pitchFamily="34" charset="0"/>
-              <a:cs typeface="Calibri" pitchFamily="34" charset="0"/>
             </a:endParaRPr>
           </a:p>
         </p:txBody>
@@ -9424,8 +9247,6 @@
                 <a:solidFill>
                   <a:srgbClr val="000000"/>
                 </a:solidFill>
-                <a:latin typeface="Calibri" pitchFamily="34" charset="0"/>
-                <a:cs typeface="Calibri" pitchFamily="34" charset="0"/>
               </a:rPr>
               <a:t>CCSv5 – For More Info…</a:t>
             </a:r>
@@ -9433,8 +9254,6 @@
               <a:solidFill>
                 <a:srgbClr val="000000"/>
               </a:solidFill>
-              <a:latin typeface="Calibri" pitchFamily="34" charset="0"/>
-              <a:cs typeface="Calibri" pitchFamily="34" charset="0"/>
             </a:endParaRPr>
           </a:p>
         </p:txBody>
@@ -9477,39 +9296,6 @@
       </p:grpSpPr>
       <p:sp>
         <p:nvSpPr>
-          <p:cNvPr id="12" name="TextBox 11"/>
-          <p:cNvSpPr txBox="1"/>
-          <p:nvPr/>
-        </p:nvSpPr>
-        <p:spPr>
-          <a:xfrm>
-            <a:off x="228600" y="6430059"/>
-            <a:ext cx="8686800" cy="387798"/>
-          </a:xfrm>
-          <a:prstGeom prst="rect">
-            <a:avLst/>
-          </a:prstGeom>
-          <a:solidFill>
-            <a:schemeClr val="bg1"/>
-          </a:solidFill>
-        </p:spPr>
-        <p:txBody>
-          <a:bodyPr wrap="square" rtlCol="0" anchor="ctr" anchorCtr="0">
-            <a:spAutoFit/>
-          </a:bodyPr>
-          <a:lstStyle/>
-          <a:p>
-            <a:endParaRPr lang="en-US" dirty="0" smtClean="0">
-              <a:solidFill>
-                <a:schemeClr val="dk1"/>
-              </a:solidFill>
-              <a:effectLst/>
-            </a:endParaRPr>
-          </a:p>
-        </p:txBody>
-      </p:sp>
-      <p:sp>
-        <p:nvSpPr>
           <p:cNvPr id="20482" name="Rectangle 4"/>
           <p:cNvSpPr>
             <a:spLocks noGrp="1" noChangeArrowheads="1"/>
@@ -9541,7 +9327,7 @@
         <p:spPr bwMode="auto">
           <a:xfrm>
             <a:off x="152400" y="679450"/>
-            <a:ext cx="8839200" cy="1606594"/>
+            <a:ext cx="8950325" cy="1274763"/>
           </a:xfrm>
           <a:prstGeom prst="rect">
             <a:avLst/>
@@ -9555,7 +9341,7 @@
           </a:ln>
         </p:spPr>
         <p:txBody>
-          <a:bodyPr wrap="square">
+          <a:bodyPr wrap="none">
             <a:spAutoFit/>
           </a:bodyPr>
           <a:lstStyle/>
@@ -9573,31 +9359,26 @@
             </a:pPr>
             <a:r>
               <a:rPr lang="en-US" i="1" u="sng" dirty="0">
-                <a:latin typeface="Calibri" pitchFamily="34" charset="0"/>
-                <a:cs typeface="Calibri" pitchFamily="34" charset="0"/>
+                <a:latin typeface="Arial Narrow" pitchFamily="34" charset="0"/>
               </a:rPr>
               <a:t>Build Configuration</a:t>
             </a:r>
             <a:r>
               <a:rPr lang="en-US" dirty="0">
-                <a:latin typeface="Calibri" pitchFamily="34" charset="0"/>
-                <a:cs typeface="Calibri" pitchFamily="34" charset="0"/>
+                <a:latin typeface="Arial Narrow" pitchFamily="34" charset="0"/>
               </a:rPr>
-              <a:t> – a set of build options for the compiler and </a:t>
-            </a:r>
-            <a:r>
-              <a:rPr lang="en-US" dirty="0" smtClean="0">
-                <a:latin typeface="Calibri" pitchFamily="34" charset="0"/>
-                <a:cs typeface="Calibri" pitchFamily="34" charset="0"/>
+              <a:t> – a set of build options for the compiler and linker</a:t>
+            </a:r>
+            <a:br>
+              <a:rPr lang="en-US" dirty="0">
+                <a:latin typeface="Arial Narrow" pitchFamily="34" charset="0"/>
               </a:rPr>
-              <a:t>linker (e.g</a:t>
-            </a:r>
+            </a:br>
             <a:r>
               <a:rPr lang="en-US" dirty="0">
-                <a:latin typeface="Calibri" pitchFamily="34" charset="0"/>
-                <a:cs typeface="Calibri" pitchFamily="34" charset="0"/>
+                <a:latin typeface="Arial Narrow" pitchFamily="34" charset="0"/>
               </a:rPr>
-              <a:t>. optimization levels, include DIRs, debug symbols, etc.) </a:t>
+              <a:t>(e.g. optimization levels, include DIRs, debug symbols, etc.) </a:t>
             </a:r>
           </a:p>
           <a:p>
@@ -9614,29 +9395,25 @@
             </a:pPr>
             <a:r>
               <a:rPr lang="en-US" dirty="0" smtClean="0">
-                <a:latin typeface="Calibri" pitchFamily="34" charset="0"/>
-                <a:cs typeface="Calibri" pitchFamily="34" charset="0"/>
+                <a:latin typeface="Arial Narrow" pitchFamily="34" charset="0"/>
               </a:rPr>
               <a:t>CCSv5 </a:t>
             </a:r>
             <a:r>
               <a:rPr lang="en-US" dirty="0">
-                <a:latin typeface="Calibri" pitchFamily="34" charset="0"/>
-                <a:cs typeface="Calibri" pitchFamily="34" charset="0"/>
+                <a:latin typeface="Arial Narrow" pitchFamily="34" charset="0"/>
               </a:rPr>
               <a:t>comes std with two DEFAULT build </a:t>
             </a:r>
             <a:r>
               <a:rPr lang="en-US" dirty="0" err="1">
-                <a:latin typeface="Calibri" pitchFamily="34" charset="0"/>
-                <a:cs typeface="Calibri" pitchFamily="34" charset="0"/>
+                <a:latin typeface="Arial Narrow" pitchFamily="34" charset="0"/>
               </a:rPr>
               <a:t>configs</a:t>
             </a:r>
             <a:r>
               <a:rPr lang="en-US" dirty="0">
-                <a:latin typeface="Calibri" pitchFamily="34" charset="0"/>
-                <a:cs typeface="Calibri" pitchFamily="34" charset="0"/>
+                <a:latin typeface="Arial Narrow" pitchFamily="34" charset="0"/>
               </a:rPr>
               <a:t>: Debug &amp; Release:</a:t>
             </a:r>
@@ -9777,7 +9554,7 @@
         <p:spPr bwMode="auto">
           <a:xfrm>
             <a:off x="152400" y="2932113"/>
-            <a:ext cx="8593250" cy="424732"/>
+            <a:ext cx="8051800" cy="420687"/>
           </a:xfrm>
           <a:prstGeom prst="rect">
             <a:avLst/>
@@ -9809,8 +9586,7 @@
             </a:pPr>
             <a:r>
               <a:rPr lang="en-US">
-                <a:latin typeface="Calibri" pitchFamily="34" charset="0"/>
-                <a:cs typeface="Calibri" pitchFamily="34" charset="0"/>
+                <a:latin typeface="Arial Narrow" pitchFamily="34" charset="0"/>
               </a:rPr>
               <a:t>User can modify compiler/linker options via “Build Properties”:</a:t>
             </a:r>
@@ -9828,7 +9604,7 @@
         <p:spPr bwMode="auto">
           <a:xfrm>
             <a:off x="2117725" y="3364597"/>
-            <a:ext cx="1151277" cy="344710"/>
+            <a:ext cx="1284288" cy="336550"/>
           </a:xfrm>
           <a:prstGeom prst="rect">
             <a:avLst/>
@@ -9852,8 +9628,6 @@
                 <a:solidFill>
                   <a:schemeClr val="tx2"/>
                 </a:solidFill>
-                <a:latin typeface="Calibri" pitchFamily="34" charset="0"/>
-                <a:cs typeface="Calibri" pitchFamily="34" charset="0"/>
               </a:rPr>
               <a:t>Compiler</a:t>
             </a:r>
@@ -9871,7 +9645,7 @@
         <p:spPr bwMode="auto">
           <a:xfrm>
             <a:off x="6521450" y="3364597"/>
-            <a:ext cx="831703" cy="344710"/>
+            <a:ext cx="946150" cy="336550"/>
           </a:xfrm>
           <a:prstGeom prst="rect">
             <a:avLst/>
@@ -9895,8 +9669,6 @@
                 <a:solidFill>
                   <a:schemeClr val="tx2"/>
                 </a:solidFill>
-                <a:latin typeface="Calibri" pitchFamily="34" charset="0"/>
-                <a:cs typeface="Calibri" pitchFamily="34" charset="0"/>
               </a:rPr>
               <a:t>Linker</a:t>
             </a:r>
@@ -9912,7 +9684,7 @@
         <p:spPr>
           <a:xfrm>
             <a:off x="6432550" y="2176463"/>
-            <a:ext cx="2140394" cy="541046"/>
+            <a:ext cx="1944688" cy="536575"/>
           </a:xfrm>
           <a:prstGeom prst="rect">
             <a:avLst/>
@@ -9937,8 +9709,7 @@
                 <a:solidFill>
                   <a:schemeClr val="tx2"/>
                 </a:solidFill>
-                <a:latin typeface="Calibri" pitchFamily="34" charset="0"/>
-                <a:cs typeface="Calibri" pitchFamily="34" charset="0"/>
+                <a:latin typeface="Arial Narrow" pitchFamily="34" charset="0"/>
               </a:rPr>
               <a:t>User can create their</a:t>
             </a:r>
@@ -9947,8 +9718,7 @@
                 <a:solidFill>
                   <a:schemeClr val="tx2"/>
                 </a:solidFill>
-                <a:latin typeface="Calibri" pitchFamily="34" charset="0"/>
-                <a:cs typeface="Calibri" pitchFamily="34" charset="0"/>
+                <a:latin typeface="Arial Narrow" pitchFamily="34" charset="0"/>
               </a:rPr>
             </a:br>
             <a:r>
@@ -9956,8 +9726,7 @@
                 <a:solidFill>
                   <a:schemeClr val="tx2"/>
                 </a:solidFill>
-                <a:latin typeface="Calibri" pitchFamily="34" charset="0"/>
-                <a:cs typeface="Calibri" pitchFamily="34" charset="0"/>
+                <a:latin typeface="Arial Narrow" pitchFamily="34" charset="0"/>
               </a:rPr>
               <a:t>own </a:t>
             </a:r>
@@ -9966,8 +9735,7 @@
                 <a:solidFill>
                   <a:schemeClr val="tx2"/>
                 </a:solidFill>
-                <a:latin typeface="Calibri" pitchFamily="34" charset="0"/>
-                <a:cs typeface="Calibri" pitchFamily="34" charset="0"/>
+                <a:latin typeface="Arial Narrow" pitchFamily="34" charset="0"/>
               </a:rPr>
               <a:t>config</a:t>
             </a:r>
@@ -9976,8 +9744,7 @@
                 <a:solidFill>
                   <a:schemeClr val="tx2"/>
                 </a:solidFill>
-                <a:latin typeface="Calibri" pitchFamily="34" charset="0"/>
-                <a:cs typeface="Calibri" pitchFamily="34" charset="0"/>
+                <a:latin typeface="Arial Narrow" pitchFamily="34" charset="0"/>
               </a:rPr>
               <a:t> if desired</a:t>
             </a:r>
@@ -10225,8 +9992,6 @@
                 <a:solidFill>
                   <a:srgbClr val="000000"/>
                 </a:solidFill>
-                <a:latin typeface="Calibri" pitchFamily="34" charset="0"/>
-                <a:cs typeface="Calibri" pitchFamily="34" charset="0"/>
               </a:rPr>
               <a:t>Intro to CCSv5</a:t>
             </a:r>
@@ -10234,8 +9999,6 @@
               <a:solidFill>
                 <a:srgbClr val="000000"/>
               </a:solidFill>
-              <a:latin typeface="Calibri" pitchFamily="34" charset="0"/>
-              <a:cs typeface="Calibri" pitchFamily="34" charset="0"/>
             </a:endParaRPr>
           </a:p>
         </p:txBody>
@@ -10295,8 +10058,6 @@
                 <a:solidFill>
                   <a:srgbClr val="000000"/>
                 </a:solidFill>
-                <a:latin typeface="Calibri" pitchFamily="34" charset="0"/>
-                <a:cs typeface="Calibri" pitchFamily="34" charset="0"/>
               </a:rPr>
               <a:t>Functional Overview</a:t>
             </a:r>
@@ -10304,8 +10065,6 @@
               <a:solidFill>
                 <a:srgbClr val="000000"/>
               </a:solidFill>
-              <a:latin typeface="Calibri" pitchFamily="34" charset="0"/>
-              <a:cs typeface="Calibri" pitchFamily="34" charset="0"/>
             </a:endParaRPr>
           </a:p>
         </p:txBody>
@@ -10365,8 +10124,6 @@
                 <a:solidFill>
                   <a:srgbClr val="000000"/>
                 </a:solidFill>
-                <a:latin typeface="Calibri" pitchFamily="34" charset="0"/>
-                <a:cs typeface="Calibri" pitchFamily="34" charset="0"/>
               </a:rPr>
               <a:t>Perspectives</a:t>
             </a:r>
@@ -10374,8 +10131,6 @@
               <a:solidFill>
                 <a:srgbClr val="000000"/>
               </a:solidFill>
-              <a:latin typeface="Calibri" pitchFamily="34" charset="0"/>
-              <a:cs typeface="Calibri" pitchFamily="34" charset="0"/>
             </a:endParaRPr>
           </a:p>
         </p:txBody>
@@ -10435,8 +10190,6 @@
                 <a:solidFill>
                   <a:srgbClr val="000000"/>
                 </a:solidFill>
-                <a:latin typeface="Calibri" pitchFamily="34" charset="0"/>
-                <a:cs typeface="Calibri" pitchFamily="34" charset="0"/>
               </a:rPr>
               <a:t>Projects</a:t>
             </a:r>
@@ -10444,8 +10197,6 @@
               <a:solidFill>
                 <a:srgbClr val="000000"/>
               </a:solidFill>
-              <a:latin typeface="Calibri" pitchFamily="34" charset="0"/>
-              <a:cs typeface="Calibri" pitchFamily="34" charset="0"/>
             </a:endParaRPr>
           </a:p>
         </p:txBody>
@@ -10505,8 +10256,6 @@
                 <a:solidFill>
                   <a:srgbClr val="000000"/>
                 </a:solidFill>
-                <a:latin typeface="Calibri" pitchFamily="34" charset="0"/>
-                <a:cs typeface="Calibri" pitchFamily="34" charset="0"/>
               </a:rPr>
               <a:t>Target Configuration</a:t>
             </a:r>
@@ -10514,8 +10263,6 @@
               <a:solidFill>
                 <a:srgbClr val="000000"/>
               </a:solidFill>
-              <a:latin typeface="Calibri" pitchFamily="34" charset="0"/>
-              <a:cs typeface="Calibri" pitchFamily="34" charset="0"/>
             </a:endParaRPr>
           </a:p>
         </p:txBody>
@@ -10575,8 +10322,6 @@
                 <a:solidFill>
                   <a:srgbClr val="000000"/>
                 </a:solidFill>
-                <a:latin typeface="Calibri" pitchFamily="34" charset="0"/>
-                <a:cs typeface="Calibri" pitchFamily="34" charset="0"/>
               </a:rPr>
               <a:t>Build Config &amp; Options</a:t>
             </a:r>
@@ -10584,8 +10329,6 @@
               <a:solidFill>
                 <a:srgbClr val="000000"/>
               </a:solidFill>
-              <a:latin typeface="Calibri" pitchFamily="34" charset="0"/>
-              <a:cs typeface="Calibri" pitchFamily="34" charset="0"/>
             </a:endParaRPr>
           </a:p>
         </p:txBody>
@@ -10649,8 +10392,6 @@
                 <a:solidFill>
                   <a:srgbClr val="000000"/>
                 </a:solidFill>
-                <a:latin typeface="Calibri" pitchFamily="34" charset="0"/>
-                <a:cs typeface="Calibri" pitchFamily="34" charset="0"/>
               </a:rPr>
               <a:t>Licensing/Pricing</a:t>
             </a:r>
@@ -10658,8 +10399,6 @@
               <a:solidFill>
                 <a:srgbClr val="000000"/>
               </a:solidFill>
-              <a:latin typeface="Calibri" pitchFamily="34" charset="0"/>
-              <a:cs typeface="Calibri" pitchFamily="34" charset="0"/>
             </a:endParaRPr>
           </a:p>
         </p:txBody>
@@ -10719,8 +10458,6 @@
                 <a:solidFill>
                   <a:srgbClr val="000000"/>
                 </a:solidFill>
-                <a:latin typeface="Calibri" pitchFamily="34" charset="0"/>
-                <a:cs typeface="Calibri" pitchFamily="34" charset="0"/>
               </a:rPr>
               <a:t>CCSv5 – For More Info…</a:t>
             </a:r>
@@ -10728,8 +10465,6 @@
               <a:solidFill>
                 <a:srgbClr val="000000"/>
               </a:solidFill>
-              <a:latin typeface="Calibri" pitchFamily="34" charset="0"/>
-              <a:cs typeface="Calibri" pitchFamily="34" charset="0"/>
             </a:endParaRPr>
           </a:p>
         </p:txBody>
@@ -10812,7 +10547,7 @@
           <a:lstStyle/>
           <a:p>
             <a:r>
-              <a:rPr lang="en-US" dirty="0" smtClean="0">
+              <a:rPr lang="en-US" smtClean="0">
                 <a:solidFill>
                   <a:schemeClr val="tx1"/>
                 </a:solidFill>
@@ -10881,8 +10616,6 @@
                 <a:solidFill>
                   <a:srgbClr val="000000"/>
                 </a:solidFill>
-                <a:latin typeface="Calibri" pitchFamily="34" charset="0"/>
-                <a:cs typeface="Calibri" pitchFamily="34" charset="0"/>
               </a:rPr>
               <a:t>Intro to CCSv5</a:t>
             </a:r>
@@ -10890,8 +10623,6 @@
               <a:solidFill>
                 <a:srgbClr val="000000"/>
               </a:solidFill>
-              <a:latin typeface="Calibri" pitchFamily="34" charset="0"/>
-              <a:cs typeface="Calibri" pitchFamily="34" charset="0"/>
             </a:endParaRPr>
           </a:p>
         </p:txBody>
@@ -10951,8 +10682,6 @@
                 <a:solidFill>
                   <a:srgbClr val="000000"/>
                 </a:solidFill>
-                <a:latin typeface="Calibri" pitchFamily="34" charset="0"/>
-                <a:cs typeface="Calibri" pitchFamily="34" charset="0"/>
               </a:rPr>
               <a:t>Functional Overview</a:t>
             </a:r>
@@ -10960,8 +10689,6 @@
               <a:solidFill>
                 <a:srgbClr val="000000"/>
               </a:solidFill>
-              <a:latin typeface="Calibri" pitchFamily="34" charset="0"/>
-              <a:cs typeface="Calibri" pitchFamily="34" charset="0"/>
             </a:endParaRPr>
           </a:p>
         </p:txBody>
@@ -11021,8 +10748,6 @@
                 <a:solidFill>
                   <a:srgbClr val="000000"/>
                 </a:solidFill>
-                <a:latin typeface="Calibri" pitchFamily="34" charset="0"/>
-                <a:cs typeface="Calibri" pitchFamily="34" charset="0"/>
               </a:rPr>
               <a:t>Perspectives</a:t>
             </a:r>
@@ -11030,8 +10755,6 @@
               <a:solidFill>
                 <a:srgbClr val="000000"/>
               </a:solidFill>
-              <a:latin typeface="Calibri" pitchFamily="34" charset="0"/>
-              <a:cs typeface="Calibri" pitchFamily="34" charset="0"/>
             </a:endParaRPr>
           </a:p>
         </p:txBody>
@@ -11087,12 +10810,10 @@
               <a:buChar char=""/>
             </a:pPr>
             <a:r>
-              <a:rPr lang="en-US" dirty="0" smtClean="0">
+              <a:rPr lang="en-US" smtClean="0">
                 <a:solidFill>
                   <a:srgbClr val="000000"/>
                 </a:solidFill>
-                <a:latin typeface="Calibri" pitchFamily="34" charset="0"/>
-                <a:cs typeface="Calibri" pitchFamily="34" charset="0"/>
               </a:rPr>
               <a:t>Projects</a:t>
             </a:r>
@@ -11100,8 +10821,6 @@
               <a:solidFill>
                 <a:srgbClr val="000000"/>
               </a:solidFill>
-              <a:latin typeface="Calibri" pitchFamily="34" charset="0"/>
-              <a:cs typeface="Calibri" pitchFamily="34" charset="0"/>
             </a:endParaRPr>
           </a:p>
         </p:txBody>
@@ -11161,8 +10880,6 @@
                 <a:solidFill>
                   <a:srgbClr val="000000"/>
                 </a:solidFill>
-                <a:latin typeface="Calibri" pitchFamily="34" charset="0"/>
-                <a:cs typeface="Calibri" pitchFamily="34" charset="0"/>
               </a:rPr>
               <a:t>Target Configuration</a:t>
             </a:r>
@@ -11170,8 +10887,6 @@
               <a:solidFill>
                 <a:srgbClr val="000000"/>
               </a:solidFill>
-              <a:latin typeface="Calibri" pitchFamily="34" charset="0"/>
-              <a:cs typeface="Calibri" pitchFamily="34" charset="0"/>
             </a:endParaRPr>
           </a:p>
         </p:txBody>
@@ -11231,8 +10946,6 @@
                 <a:solidFill>
                   <a:srgbClr val="000000"/>
                 </a:solidFill>
-                <a:latin typeface="Calibri" pitchFamily="34" charset="0"/>
-                <a:cs typeface="Calibri" pitchFamily="34" charset="0"/>
               </a:rPr>
               <a:t>Build Config &amp; Options</a:t>
             </a:r>
@@ -11240,8 +10953,6 @@
               <a:solidFill>
                 <a:srgbClr val="000000"/>
               </a:solidFill>
-              <a:latin typeface="Calibri" pitchFamily="34" charset="0"/>
-              <a:cs typeface="Calibri" pitchFamily="34" charset="0"/>
             </a:endParaRPr>
           </a:p>
         </p:txBody>
@@ -11301,8 +11012,6 @@
                 <a:solidFill>
                   <a:srgbClr val="000000"/>
                 </a:solidFill>
-                <a:latin typeface="Calibri" pitchFamily="34" charset="0"/>
-                <a:cs typeface="Calibri" pitchFamily="34" charset="0"/>
               </a:rPr>
               <a:t>Licensing/Pricing</a:t>
             </a:r>
@@ -11310,8 +11019,6 @@
               <a:solidFill>
                 <a:srgbClr val="000000"/>
               </a:solidFill>
-              <a:latin typeface="Calibri" pitchFamily="34" charset="0"/>
-              <a:cs typeface="Calibri" pitchFamily="34" charset="0"/>
             </a:endParaRPr>
           </a:p>
         </p:txBody>
@@ -11371,8 +11078,6 @@
                 <a:solidFill>
                   <a:srgbClr val="000000"/>
                 </a:solidFill>
-                <a:latin typeface="Calibri" pitchFamily="34" charset="0"/>
-                <a:cs typeface="Calibri" pitchFamily="34" charset="0"/>
               </a:rPr>
               <a:t>CCSv5 – For More Info…</a:t>
             </a:r>
@@ -11380,8 +11085,6 @@
               <a:solidFill>
                 <a:srgbClr val="000000"/>
               </a:solidFill>
-              <a:latin typeface="Calibri" pitchFamily="34" charset="0"/>
-              <a:cs typeface="Calibri" pitchFamily="34" charset="0"/>
             </a:endParaRPr>
           </a:p>
         </p:txBody>
@@ -13396,7 +13099,7 @@
         <p:spPr bwMode="auto">
           <a:xfrm>
             <a:off x="111456" y="682117"/>
-            <a:ext cx="1694695" cy="424732"/>
+            <a:ext cx="1947863" cy="420688"/>
           </a:xfrm>
           <a:prstGeom prst="rect">
             <a:avLst/>
@@ -13427,10 +13130,7 @@
               <a:buChar char=""/>
             </a:pPr>
             <a:r>
-              <a:rPr lang="en-US" dirty="0">
-                <a:latin typeface="Calibri" pitchFamily="34" charset="0"/>
-                <a:cs typeface="Calibri" pitchFamily="34" charset="0"/>
-              </a:rPr>
+              <a:rPr lang="en-US"/>
               <a:t>Licensing</a:t>
             </a:r>
           </a:p>
@@ -13447,7 +13147,7 @@
         <p:spPr bwMode="auto">
           <a:xfrm>
             <a:off x="492456" y="1144080"/>
-            <a:ext cx="6866688" cy="1144929"/>
+            <a:ext cx="6343650" cy="1130300"/>
           </a:xfrm>
           <a:prstGeom prst="rect">
             <a:avLst/>
@@ -13472,8 +13172,7 @@
             </a:pPr>
             <a:r>
               <a:rPr lang="en-US" sz="2000">
-                <a:latin typeface="Calibri" pitchFamily="34" charset="0"/>
-                <a:cs typeface="Calibri" pitchFamily="34" charset="0"/>
+                <a:latin typeface="Arial Narrow" pitchFamily="34" charset="0"/>
               </a:rPr>
               <a:t>  Wide variety of options (node locked, floating, time based…)</a:t>
             </a:r>
@@ -13485,8 +13184,7 @@
             </a:pPr>
             <a:r>
               <a:rPr lang="en-US" sz="2000">
-                <a:latin typeface="Calibri" pitchFamily="34" charset="0"/>
-                <a:cs typeface="Calibri" pitchFamily="34" charset="0"/>
+                <a:latin typeface="Arial Narrow" pitchFamily="34" charset="0"/>
               </a:rPr>
               <a:t>  All versions (full, DSK, free tools) use same image</a:t>
             </a:r>
@@ -13498,8 +13196,7 @@
             </a:pPr>
             <a:r>
               <a:rPr lang="en-US" sz="2000">
-                <a:latin typeface="Calibri" pitchFamily="34" charset="0"/>
-                <a:cs typeface="Calibri" pitchFamily="34" charset="0"/>
+                <a:latin typeface="Arial Narrow" pitchFamily="34" charset="0"/>
               </a:rPr>
               <a:t>  Updates readily available via the internet</a:t>
             </a:r>
@@ -13517,7 +13214,7 @@
         <p:spPr bwMode="auto">
           <a:xfrm>
             <a:off x="111456" y="2434717"/>
-            <a:ext cx="1393330" cy="424732"/>
+            <a:ext cx="1558925" cy="420688"/>
           </a:xfrm>
           <a:prstGeom prst="rect">
             <a:avLst/>
@@ -13548,10 +13245,7 @@
               <a:buChar char=""/>
             </a:pPr>
             <a:r>
-              <a:rPr lang="en-US">
-                <a:latin typeface="Calibri" pitchFamily="34" charset="0"/>
-                <a:cs typeface="Calibri" pitchFamily="34" charset="0"/>
-              </a:rPr>
+              <a:rPr lang="en-US"/>
               <a:t>Pricing</a:t>
             </a:r>
           </a:p>
@@ -13568,7 +13262,7 @@
         <p:spPr bwMode="auto">
           <a:xfrm>
             <a:off x="492456" y="2891917"/>
-            <a:ext cx="6394251" cy="344710"/>
+            <a:ext cx="6054725" cy="336550"/>
           </a:xfrm>
           <a:prstGeom prst="rect">
             <a:avLst/>
@@ -13593,8 +13287,7 @@
             </a:pPr>
             <a:r>
               <a:rPr lang="en-US" sz="2000">
-                <a:latin typeface="Calibri" pitchFamily="34" charset="0"/>
-                <a:cs typeface="Calibri" pitchFamily="34" charset="0"/>
+                <a:latin typeface="Arial Narrow" pitchFamily="34" charset="0"/>
               </a:rPr>
               <a:t>  Reasonable pricing – includes FREE options noted below</a:t>
             </a:r>
@@ -13612,7 +13305,7 @@
         <p:spPr bwMode="auto">
           <a:xfrm>
             <a:off x="990600" y="6238875"/>
-            <a:ext cx="7339381" cy="313932"/>
+            <a:ext cx="6737742" cy="313932"/>
           </a:xfrm>
           <a:prstGeom prst="rect">
             <a:avLst/>
@@ -13636,93 +13329,42 @@
                 <a:solidFill>
                   <a:srgbClr val="000000"/>
                 </a:solidFill>
-                <a:latin typeface="Calibri" pitchFamily="34" charset="0"/>
-                <a:cs typeface="Calibri" pitchFamily="34" charset="0"/>
+                <a:latin typeface="Arial Narrow" pitchFamily="34" charset="0"/>
                 <a:sym typeface="Wingdings" pitchFamily="2" charset="2"/>
               </a:rPr>
-              <a:t> - </a:t>
+              <a:t> - recommended option: purchase </a:t>
             </a:r>
             <a:r>
               <a:rPr lang="en-CA" sz="1800" b="0" dirty="0" smtClean="0">
                 <a:solidFill>
                   <a:srgbClr val="000000"/>
                 </a:solidFill>
-                <a:latin typeface="Calibri" pitchFamily="34" charset="0"/>
-                <a:cs typeface="Calibri" pitchFamily="34" charset="0"/>
+                <a:latin typeface="Arial Narrow" pitchFamily="34" charset="0"/>
                 <a:sym typeface="Wingdings" pitchFamily="2" charset="2"/>
               </a:rPr>
-              <a:t>Recommended </a:t>
+              <a:t>Dev Kit, use XDS100v1-2, </a:t>
             </a:r>
             <a:r>
               <a:rPr lang="en-CA" sz="1800" b="0" dirty="0">
                 <a:solidFill>
                   <a:srgbClr val="000000"/>
                 </a:solidFill>
-                <a:latin typeface="Calibri" pitchFamily="34" charset="0"/>
-                <a:cs typeface="Calibri" pitchFamily="34" charset="0"/>
+                <a:latin typeface="Arial Narrow" pitchFamily="34" charset="0"/>
                 <a:sym typeface="Wingdings" pitchFamily="2" charset="2"/>
               </a:rPr>
-              <a:t>O</a:t>
+              <a:t>&amp; Free </a:t>
             </a:r>
             <a:r>
               <a:rPr lang="en-CA" sz="1800" b="0" dirty="0" smtClean="0">
                 <a:solidFill>
                   <a:srgbClr val="000000"/>
                 </a:solidFill>
-                <a:latin typeface="Calibri" pitchFamily="34" charset="0"/>
-                <a:cs typeface="Calibri" pitchFamily="34" charset="0"/>
-                <a:sym typeface="Wingdings" pitchFamily="2" charset="2"/>
-              </a:rPr>
-              <a:t>ption</a:t>
-            </a:r>
-            <a:r>
-              <a:rPr lang="en-CA" sz="1800" b="0" dirty="0">
-                <a:solidFill>
-                  <a:srgbClr val="000000"/>
-                </a:solidFill>
-                <a:latin typeface="Calibri" pitchFamily="34" charset="0"/>
-                <a:cs typeface="Calibri" pitchFamily="34" charset="0"/>
-                <a:sym typeface="Wingdings" pitchFamily="2" charset="2"/>
-              </a:rPr>
-              <a:t>: purchase </a:t>
-            </a:r>
-            <a:r>
-              <a:rPr lang="en-CA" sz="1800" b="0" dirty="0" smtClean="0">
-                <a:solidFill>
-                  <a:srgbClr val="000000"/>
-                </a:solidFill>
-                <a:latin typeface="Calibri" pitchFamily="34" charset="0"/>
-                <a:cs typeface="Calibri" pitchFamily="34" charset="0"/>
-                <a:sym typeface="Wingdings" pitchFamily="2" charset="2"/>
-              </a:rPr>
-              <a:t>Dev Kit, use XDS100v1-2, </a:t>
-            </a:r>
-            <a:r>
-              <a:rPr lang="en-CA" sz="1800" b="0" dirty="0">
-                <a:solidFill>
-                  <a:srgbClr val="000000"/>
-                </a:solidFill>
-                <a:latin typeface="Calibri" pitchFamily="34" charset="0"/>
-                <a:cs typeface="Calibri" pitchFamily="34" charset="0"/>
-                <a:sym typeface="Wingdings" pitchFamily="2" charset="2"/>
-              </a:rPr>
-              <a:t>&amp; Free </a:t>
-            </a:r>
-            <a:r>
-              <a:rPr lang="en-CA" sz="1800" b="0" dirty="0" smtClean="0">
-                <a:solidFill>
-                  <a:srgbClr val="000000"/>
-                </a:solidFill>
-                <a:latin typeface="Calibri" pitchFamily="34" charset="0"/>
-                <a:cs typeface="Calibri" pitchFamily="34" charset="0"/>
+                <a:latin typeface="Arial Narrow" pitchFamily="34" charset="0"/>
                 <a:sym typeface="Wingdings" pitchFamily="2" charset="2"/>
               </a:rPr>
               <a:t>CCSv5</a:t>
             </a:r>
-            <a:endParaRPr lang="en-US" sz="1800" dirty="0">
-              <a:latin typeface="Calibri" pitchFamily="34" charset="0"/>
-              <a:cs typeface="Calibri" pitchFamily="34" charset="0"/>
-            </a:endParaRPr>
+            <a:endParaRPr lang="en-US" sz="1800" dirty="0"/>
           </a:p>
         </p:txBody>
       </p:sp>
@@ -13964,8 +13606,6 @@
                 <a:solidFill>
                   <a:srgbClr val="000000"/>
                 </a:solidFill>
-                <a:latin typeface="Calibri" pitchFamily="34" charset="0"/>
-                <a:cs typeface="Calibri" pitchFamily="34" charset="0"/>
               </a:rPr>
               <a:t>Intro to CCSv5</a:t>
             </a:r>
@@ -13973,8 +13613,6 @@
               <a:solidFill>
                 <a:srgbClr val="000000"/>
               </a:solidFill>
-              <a:latin typeface="Calibri" pitchFamily="34" charset="0"/>
-              <a:cs typeface="Calibri" pitchFamily="34" charset="0"/>
             </a:endParaRPr>
           </a:p>
         </p:txBody>
@@ -14034,8 +13672,6 @@
                 <a:solidFill>
                   <a:srgbClr val="000000"/>
                 </a:solidFill>
-                <a:latin typeface="Calibri" pitchFamily="34" charset="0"/>
-                <a:cs typeface="Calibri" pitchFamily="34" charset="0"/>
               </a:rPr>
               <a:t>Functional Overview</a:t>
             </a:r>
@@ -14043,8 +13679,6 @@
               <a:solidFill>
                 <a:srgbClr val="000000"/>
               </a:solidFill>
-              <a:latin typeface="Calibri" pitchFamily="34" charset="0"/>
-              <a:cs typeface="Calibri" pitchFamily="34" charset="0"/>
             </a:endParaRPr>
           </a:p>
         </p:txBody>
@@ -14100,12 +13734,10 @@
               <a:buChar char=""/>
             </a:pPr>
             <a:r>
-              <a:rPr lang="en-US" dirty="0" smtClean="0">
+              <a:rPr lang="en-US" smtClean="0">
                 <a:solidFill>
                   <a:srgbClr val="000000"/>
                 </a:solidFill>
-                <a:latin typeface="Calibri" pitchFamily="34" charset="0"/>
-                <a:cs typeface="Calibri" pitchFamily="34" charset="0"/>
               </a:rPr>
               <a:t>Perspectives</a:t>
             </a:r>
@@ -14113,8 +13745,6 @@
               <a:solidFill>
                 <a:srgbClr val="000000"/>
               </a:solidFill>
-              <a:latin typeface="Calibri" pitchFamily="34" charset="0"/>
-              <a:cs typeface="Calibri" pitchFamily="34" charset="0"/>
             </a:endParaRPr>
           </a:p>
         </p:txBody>
@@ -14170,12 +13800,10 @@
               <a:buChar char=""/>
             </a:pPr>
             <a:r>
-              <a:rPr lang="en-US" dirty="0" smtClean="0">
+              <a:rPr lang="en-US" smtClean="0">
                 <a:solidFill>
                   <a:srgbClr val="000000"/>
                 </a:solidFill>
-                <a:latin typeface="Calibri" pitchFamily="34" charset="0"/>
-                <a:cs typeface="Calibri" pitchFamily="34" charset="0"/>
               </a:rPr>
               <a:t>Projects</a:t>
             </a:r>
@@ -14183,8 +13811,6 @@
               <a:solidFill>
                 <a:srgbClr val="000000"/>
               </a:solidFill>
-              <a:latin typeface="Calibri" pitchFamily="34" charset="0"/>
-              <a:cs typeface="Calibri" pitchFamily="34" charset="0"/>
             </a:endParaRPr>
           </a:p>
         </p:txBody>
@@ -14244,8 +13870,6 @@
                 <a:solidFill>
                   <a:srgbClr val="000000"/>
                 </a:solidFill>
-                <a:latin typeface="Calibri" pitchFamily="34" charset="0"/>
-                <a:cs typeface="Calibri" pitchFamily="34" charset="0"/>
               </a:rPr>
               <a:t>Target Configuration</a:t>
             </a:r>
@@ -14253,8 +13877,6 @@
               <a:solidFill>
                 <a:srgbClr val="000000"/>
               </a:solidFill>
-              <a:latin typeface="Calibri" pitchFamily="34" charset="0"/>
-              <a:cs typeface="Calibri" pitchFamily="34" charset="0"/>
             </a:endParaRPr>
           </a:p>
         </p:txBody>
@@ -14314,8 +13936,6 @@
                 <a:solidFill>
                   <a:srgbClr val="000000"/>
                 </a:solidFill>
-                <a:latin typeface="Calibri" pitchFamily="34" charset="0"/>
-                <a:cs typeface="Calibri" pitchFamily="34" charset="0"/>
               </a:rPr>
               <a:t>Build Config &amp; Options</a:t>
             </a:r>
@@ -14323,8 +13943,6 @@
               <a:solidFill>
                 <a:srgbClr val="000000"/>
               </a:solidFill>
-              <a:latin typeface="Calibri" pitchFamily="34" charset="0"/>
-              <a:cs typeface="Calibri" pitchFamily="34" charset="0"/>
             </a:endParaRPr>
           </a:p>
         </p:txBody>
@@ -14384,8 +14002,6 @@
                 <a:solidFill>
                   <a:srgbClr val="000000"/>
                 </a:solidFill>
-                <a:latin typeface="Calibri" pitchFamily="34" charset="0"/>
-                <a:cs typeface="Calibri" pitchFamily="34" charset="0"/>
               </a:rPr>
               <a:t>Licensing/Pricing</a:t>
             </a:r>
@@ -14393,8 +14009,6 @@
               <a:solidFill>
                 <a:srgbClr val="000000"/>
               </a:solidFill>
-              <a:latin typeface="Calibri" pitchFamily="34" charset="0"/>
-              <a:cs typeface="Calibri" pitchFamily="34" charset="0"/>
             </a:endParaRPr>
           </a:p>
         </p:txBody>
@@ -14458,8 +14072,6 @@
                 <a:solidFill>
                   <a:srgbClr val="000000"/>
                 </a:solidFill>
-                <a:latin typeface="Calibri" pitchFamily="34" charset="0"/>
-                <a:cs typeface="Calibri" pitchFamily="34" charset="0"/>
               </a:rPr>
               <a:t>CCSv5– For More Info…</a:t>
             </a:r>
@@ -14467,8 +14079,6 @@
               <a:solidFill>
                 <a:srgbClr val="000000"/>
               </a:solidFill>
-              <a:latin typeface="Calibri" pitchFamily="34" charset="0"/>
-              <a:cs typeface="Calibri" pitchFamily="34" charset="0"/>
             </a:endParaRPr>
           </a:p>
         </p:txBody>
@@ -14528,7 +14138,7 @@
           <a:p>
             <a:r>
               <a:rPr lang="en-US" dirty="0" smtClean="0"/>
-              <a:t>CCSv5 – For More Information</a:t>
+              <a:t>CCSv5 – For More Info…</a:t>
             </a:r>
           </a:p>
         </p:txBody>
@@ -14544,7 +14154,7 @@
         <p:spPr bwMode="auto">
           <a:xfrm>
             <a:off x="0" y="1676400"/>
-            <a:ext cx="1540422" cy="445635"/>
+            <a:ext cx="2169184" cy="437043"/>
           </a:xfrm>
           <a:prstGeom prst="rect">
             <a:avLst/>
@@ -14568,12 +14178,11 @@
                 <a:schemeClr val="tx2"/>
               </a:buClr>
               <a:buSzPct val="75000"/>
+              <a:buFont typeface="Wingdings" pitchFamily="2" charset="2"/>
+              <a:buChar char=""/>
             </a:pPr>
             <a:r>
-              <a:rPr lang="en-US" sz="2800" dirty="0">
-                <a:latin typeface="Calibri" pitchFamily="34" charset="0"/>
-                <a:cs typeface="Calibri" pitchFamily="34" charset="0"/>
-              </a:rPr>
+              <a:rPr lang="en-US" sz="2800" dirty="0"/>
               <a:t>Links for:</a:t>
             </a:r>
           </a:p>
@@ -14590,7 +14199,7 @@
         <p:spPr bwMode="auto">
           <a:xfrm>
             <a:off x="381000" y="2133600"/>
-            <a:ext cx="2590800" cy="3083921"/>
+            <a:ext cx="2815194" cy="2788456"/>
           </a:xfrm>
           <a:prstGeom prst="rect">
             <a:avLst/>
@@ -14604,7 +14213,7 @@
           </a:ln>
         </p:spPr>
         <p:txBody>
-          <a:bodyPr wrap="square">
+          <a:bodyPr wrap="none">
             <a:spAutoFit/>
           </a:bodyPr>
           <a:lstStyle/>
@@ -14615,34 +14224,18 @@
             </a:pPr>
             <a:r>
               <a:rPr lang="en-US" dirty="0">
-                <a:latin typeface="Calibri" pitchFamily="34" charset="0"/>
-                <a:cs typeface="Calibri" pitchFamily="34" charset="0"/>
+                <a:latin typeface="Arial Narrow" pitchFamily="34" charset="0"/>
               </a:rPr>
-              <a:t> </a:t>
+              <a:t> Downloading </a:t>
             </a:r>
             <a:r>
               <a:rPr lang="en-US" dirty="0" smtClean="0">
-                <a:latin typeface="Calibri" pitchFamily="34" charset="0"/>
-                <a:cs typeface="Calibri" pitchFamily="34" charset="0"/>
+                <a:latin typeface="Arial Narrow" pitchFamily="34" charset="0"/>
               </a:rPr>
-              <a:t>Downloading</a:t>
-            </a:r>
-            <a:br>
-              <a:rPr lang="en-US" dirty="0" smtClean="0">
-                <a:latin typeface="Calibri" pitchFamily="34" charset="0"/>
-                <a:cs typeface="Calibri" pitchFamily="34" charset="0"/>
-              </a:rPr>
-            </a:br>
-            <a:r>
-              <a:rPr lang="en-US" dirty="0" smtClean="0">
-                <a:latin typeface="Calibri" pitchFamily="34" charset="0"/>
-                <a:cs typeface="Calibri" pitchFamily="34" charset="0"/>
-              </a:rPr>
-              <a:t>   CCSv5</a:t>
+              <a:t>CCSv5</a:t>
             </a:r>
             <a:endParaRPr lang="en-US" dirty="0">
-              <a:latin typeface="Calibri" pitchFamily="34" charset="0"/>
-              <a:cs typeface="Calibri" pitchFamily="34" charset="0"/>
+              <a:latin typeface="Arial Narrow" pitchFamily="34" charset="0"/>
             </a:endParaRPr>
           </a:p>
           <a:p>
@@ -14652,8 +14245,7 @@
             </a:pPr>
             <a:r>
               <a:rPr lang="en-US" dirty="0">
-                <a:latin typeface="Calibri" pitchFamily="34" charset="0"/>
-                <a:cs typeface="Calibri" pitchFamily="34" charset="0"/>
+                <a:latin typeface="Arial Narrow" pitchFamily="34" charset="0"/>
               </a:rPr>
               <a:t> Installation Help</a:t>
             </a:r>
@@ -14665,8 +14257,7 @@
             </a:pPr>
             <a:r>
               <a:rPr lang="en-US" dirty="0">
-                <a:latin typeface="Calibri" pitchFamily="34" charset="0"/>
-                <a:cs typeface="Calibri" pitchFamily="34" charset="0"/>
+                <a:latin typeface="Arial Narrow" pitchFamily="34" charset="0"/>
               </a:rPr>
               <a:t> Licensing </a:t>
             </a:r>
@@ -14678,8 +14269,7 @@
             </a:pPr>
             <a:r>
               <a:rPr lang="en-US" dirty="0">
-                <a:latin typeface="Calibri" pitchFamily="34" charset="0"/>
-                <a:cs typeface="Calibri" pitchFamily="34" charset="0"/>
+                <a:latin typeface="Arial Narrow" pitchFamily="34" charset="0"/>
               </a:rPr>
               <a:t> Tutorials</a:t>
             </a:r>
@@ -14691,8 +14281,7 @@
             </a:pPr>
             <a:r>
               <a:rPr lang="en-US" dirty="0">
-                <a:latin typeface="Calibri" pitchFamily="34" charset="0"/>
-                <a:cs typeface="Calibri" pitchFamily="34" charset="0"/>
+                <a:latin typeface="Arial Narrow" pitchFamily="34" charset="0"/>
               </a:rPr>
               <a:t> BIOS Projects</a:t>
             </a:r>
@@ -14704,22 +14293,10 @@
             </a:pPr>
             <a:r>
               <a:rPr lang="en-US" dirty="0">
-                <a:latin typeface="Calibri" pitchFamily="34" charset="0"/>
-                <a:cs typeface="Calibri" pitchFamily="34" charset="0"/>
+                <a:latin typeface="Arial Narrow" pitchFamily="34" charset="0"/>
               </a:rPr>
-              <a:t> </a:t>
-            </a:r>
-            <a:r>
-              <a:rPr lang="en-US" dirty="0" smtClean="0">
-                <a:latin typeface="Calibri" pitchFamily="34" charset="0"/>
-                <a:cs typeface="Calibri" pitchFamily="34" charset="0"/>
-              </a:rPr>
-              <a:t>ETC.</a:t>
-            </a:r>
-            <a:endParaRPr lang="en-US" dirty="0">
-              <a:latin typeface="Calibri" pitchFamily="34" charset="0"/>
-              <a:cs typeface="Calibri" pitchFamily="34" charset="0"/>
-            </a:endParaRPr>
+              <a:t> Etc.</a:t>
+            </a:r>
           </a:p>
         </p:txBody>
       </p:sp>
@@ -14931,7 +14508,7 @@
           <a:lstStyle/>
           <a:p>
             <a:r>
-              <a:rPr lang="en-US" dirty="0" smtClean="0">
+              <a:rPr lang="en-US" smtClean="0">
                 <a:solidFill>
                   <a:schemeClr val="tx1"/>
                 </a:solidFill>
@@ -14996,8 +14573,6 @@
                 <a:solidFill>
                   <a:srgbClr val="000000"/>
                 </a:solidFill>
-                <a:latin typeface="Calibri" pitchFamily="34" charset="0"/>
-                <a:cs typeface="Calibri" pitchFamily="34" charset="0"/>
               </a:rPr>
               <a:t>Intro to CCSv5</a:t>
             </a:r>
@@ -15005,8 +14580,6 @@
               <a:solidFill>
                 <a:srgbClr val="000000"/>
               </a:solidFill>
-              <a:latin typeface="Calibri" pitchFamily="34" charset="0"/>
-              <a:cs typeface="Calibri" pitchFamily="34" charset="0"/>
             </a:endParaRPr>
           </a:p>
         </p:txBody>
@@ -15070,8 +14643,6 @@
                 <a:solidFill>
                   <a:srgbClr val="000000"/>
                 </a:solidFill>
-                <a:latin typeface="Calibri" pitchFamily="34" charset="0"/>
-                <a:cs typeface="Calibri" pitchFamily="34" charset="0"/>
               </a:rPr>
               <a:t>Functional Overview</a:t>
             </a:r>
@@ -15079,8 +14650,6 @@
               <a:solidFill>
                 <a:srgbClr val="000000"/>
               </a:solidFill>
-              <a:latin typeface="Calibri" pitchFamily="34" charset="0"/>
-              <a:cs typeface="Calibri" pitchFamily="34" charset="0"/>
             </a:endParaRPr>
           </a:p>
         </p:txBody>
@@ -15140,8 +14709,6 @@
                 <a:solidFill>
                   <a:srgbClr val="000000"/>
                 </a:solidFill>
-                <a:latin typeface="Calibri" pitchFamily="34" charset="0"/>
-                <a:cs typeface="Calibri" pitchFamily="34" charset="0"/>
               </a:rPr>
               <a:t>Perspectives</a:t>
             </a:r>
@@ -15149,8 +14716,6 @@
               <a:solidFill>
                 <a:srgbClr val="000000"/>
               </a:solidFill>
-              <a:latin typeface="Calibri" pitchFamily="34" charset="0"/>
-              <a:cs typeface="Calibri" pitchFamily="34" charset="0"/>
             </a:endParaRPr>
           </a:p>
         </p:txBody>
@@ -15206,12 +14771,10 @@
               <a:buChar char=""/>
             </a:pPr>
             <a:r>
-              <a:rPr lang="en-US" dirty="0" smtClean="0">
+              <a:rPr lang="en-US" smtClean="0">
                 <a:solidFill>
                   <a:srgbClr val="000000"/>
                 </a:solidFill>
-                <a:latin typeface="Calibri" pitchFamily="34" charset="0"/>
-                <a:cs typeface="Calibri" pitchFamily="34" charset="0"/>
               </a:rPr>
               <a:t>Projects</a:t>
             </a:r>
@@ -15219,8 +14782,6 @@
               <a:solidFill>
                 <a:srgbClr val="000000"/>
               </a:solidFill>
-              <a:latin typeface="Calibri" pitchFamily="34" charset="0"/>
-              <a:cs typeface="Calibri" pitchFamily="34" charset="0"/>
             </a:endParaRPr>
           </a:p>
         </p:txBody>
@@ -15280,8 +14841,6 @@
                 <a:solidFill>
                   <a:srgbClr val="000000"/>
                 </a:solidFill>
-                <a:latin typeface="Calibri" pitchFamily="34" charset="0"/>
-                <a:cs typeface="Calibri" pitchFamily="34" charset="0"/>
               </a:rPr>
               <a:t>Target Configuration</a:t>
             </a:r>
@@ -15289,8 +14848,6 @@
               <a:solidFill>
                 <a:srgbClr val="000000"/>
               </a:solidFill>
-              <a:latin typeface="Calibri" pitchFamily="34" charset="0"/>
-              <a:cs typeface="Calibri" pitchFamily="34" charset="0"/>
             </a:endParaRPr>
           </a:p>
         </p:txBody>
@@ -15350,8 +14907,6 @@
                 <a:solidFill>
                   <a:srgbClr val="000000"/>
                 </a:solidFill>
-                <a:latin typeface="Calibri" pitchFamily="34" charset="0"/>
-                <a:cs typeface="Calibri" pitchFamily="34" charset="0"/>
               </a:rPr>
               <a:t>Build Config &amp; Options</a:t>
             </a:r>
@@ -15359,8 +14914,6 @@
               <a:solidFill>
                 <a:srgbClr val="000000"/>
               </a:solidFill>
-              <a:latin typeface="Calibri" pitchFamily="34" charset="0"/>
-              <a:cs typeface="Calibri" pitchFamily="34" charset="0"/>
             </a:endParaRPr>
           </a:p>
         </p:txBody>
@@ -15420,8 +14973,6 @@
                 <a:solidFill>
                   <a:srgbClr val="000000"/>
                 </a:solidFill>
-                <a:latin typeface="Calibri" pitchFamily="34" charset="0"/>
-                <a:cs typeface="Calibri" pitchFamily="34" charset="0"/>
               </a:rPr>
               <a:t>Licensing/Pricing</a:t>
             </a:r>
@@ -15429,8 +14980,6 @@
               <a:solidFill>
                 <a:srgbClr val="000000"/>
               </a:solidFill>
-              <a:latin typeface="Calibri" pitchFamily="34" charset="0"/>
-              <a:cs typeface="Calibri" pitchFamily="34" charset="0"/>
             </a:endParaRPr>
           </a:p>
         </p:txBody>
@@ -15490,8 +15039,6 @@
                 <a:solidFill>
                   <a:srgbClr val="000000"/>
                 </a:solidFill>
-                <a:latin typeface="Calibri" pitchFamily="34" charset="0"/>
-                <a:cs typeface="Calibri" pitchFamily="34" charset="0"/>
               </a:rPr>
               <a:t>CCSv5 – For More Info…</a:t>
             </a:r>
@@ -15499,8 +15046,6 @@
               <a:solidFill>
                 <a:srgbClr val="000000"/>
               </a:solidFill>
-              <a:latin typeface="Calibri" pitchFamily="34" charset="0"/>
-              <a:cs typeface="Calibri" pitchFamily="34" charset="0"/>
             </a:endParaRPr>
           </a:p>
         </p:txBody>
@@ -15557,11 +15102,7 @@
           <a:lstStyle/>
           <a:p>
             <a:r>
-              <a:rPr lang="en-US" dirty="0" smtClean="0">
-                <a:solidFill>
-                  <a:schemeClr val="tx1"/>
-                </a:solidFill>
-              </a:rPr>
+              <a:rPr lang="en-US" smtClean="0"/>
               <a:t>CCS Functional Overview</a:t>
             </a:r>
           </a:p>
@@ -15769,8 +15310,8 @@
         </p:nvSpPr>
         <p:spPr bwMode="auto">
           <a:xfrm>
-            <a:off x="3662120" y="5080000"/>
-            <a:ext cx="1443280" cy="446276"/>
+            <a:off x="4956175" y="5080000"/>
+            <a:ext cx="1368425" cy="442913"/>
           </a:xfrm>
           <a:prstGeom prst="rect">
             <a:avLst/>
@@ -15806,9 +15347,8 @@
               </a:tabLst>
             </a:pPr>
             <a:r>
-              <a:rPr lang="en-US" sz="2000" dirty="0">
-                <a:latin typeface="Calibri" pitchFamily="34" charset="0"/>
-                <a:cs typeface="Calibri" pitchFamily="34" charset="0"/>
+              <a:rPr lang="en-US" sz="2000">
+                <a:latin typeface="Arial Narrow" pitchFamily="34" charset="0"/>
               </a:rPr>
               <a:t>Simulator</a:t>
             </a:r>
@@ -15825,8 +15365,8 @@
         </p:nvSpPr>
         <p:spPr bwMode="auto">
           <a:xfrm>
-            <a:off x="214070" y="4767263"/>
-            <a:ext cx="3688510" cy="754053"/>
+            <a:off x="1657350" y="4767263"/>
+            <a:ext cx="3532188" cy="747712"/>
           </a:xfrm>
           <a:prstGeom prst="rect">
             <a:avLst/>
@@ -15857,18 +15397,16 @@
               </a:tabLst>
             </a:pPr>
             <a:r>
-              <a:rPr lang="en-US" sz="2000" dirty="0">
+              <a:rPr lang="en-US" sz="2000">
                 <a:solidFill>
                   <a:schemeClr val="tx2"/>
                 </a:solidFill>
-                <a:latin typeface="Calibri" pitchFamily="34" charset="0"/>
-                <a:cs typeface="Calibri" pitchFamily="34" charset="0"/>
+                <a:latin typeface="Arial Narrow" pitchFamily="34" charset="0"/>
               </a:rPr>
               <a:t>Code Composer Studio Includes:</a:t>
             </a:r>
-            <a:endParaRPr lang="en-US" sz="2000" dirty="0">
-              <a:latin typeface="Calibri" pitchFamily="34" charset="0"/>
-              <a:cs typeface="Calibri" pitchFamily="34" charset="0"/>
+            <a:endParaRPr lang="en-US" sz="2000">
+              <a:latin typeface="Arial Narrow" pitchFamily="34" charset="0"/>
             </a:endParaRPr>
           </a:p>
           <a:p>
@@ -15889,9 +15427,8 @@
               </a:tabLst>
             </a:pPr>
             <a:r>
-              <a:rPr lang="en-US" sz="2000" dirty="0">
-                <a:latin typeface="Calibri" pitchFamily="34" charset="0"/>
-                <a:cs typeface="Calibri" pitchFamily="34" charset="0"/>
+              <a:rPr lang="en-US" sz="2000">
+                <a:latin typeface="Arial Narrow" pitchFamily="34" charset="0"/>
               </a:rPr>
               <a:t>Integrated Edit / Debug GUI</a:t>
             </a:r>
@@ -16342,8 +15879,8 @@
         </p:nvSpPr>
         <p:spPr bwMode="auto">
           <a:xfrm>
-            <a:off x="3586240" y="5494347"/>
-            <a:ext cx="3957558" cy="754053"/>
+            <a:off x="1657350" y="5773747"/>
+            <a:ext cx="3865161" cy="754053"/>
           </a:xfrm>
           <a:prstGeom prst="rect">
             <a:avLst/>
@@ -16380,42 +15917,36 @@
             </a:pPr>
             <a:r>
               <a:rPr lang="en-US" sz="2000" dirty="0" smtClean="0">
-                <a:latin typeface="Calibri" pitchFamily="34" charset="0"/>
-                <a:cs typeface="Calibri" pitchFamily="34" charset="0"/>
+                <a:latin typeface="Arial Narrow" pitchFamily="34" charset="0"/>
               </a:rPr>
               <a:t>SYS/BIOS</a:t>
             </a:r>
             <a:r>
               <a:rPr lang="en-US" sz="2000" dirty="0">
-                <a:latin typeface="Calibri" pitchFamily="34" charset="0"/>
-                <a:cs typeface="Calibri" pitchFamily="34" charset="0"/>
+                <a:latin typeface="Arial Narrow" pitchFamily="34" charset="0"/>
               </a:rPr>
               <a:t>:	Real-time kernel</a:t>
             </a:r>
             <a:br>
               <a:rPr lang="en-US" sz="2000" dirty="0">
-                <a:latin typeface="Calibri" pitchFamily="34" charset="0"/>
-                <a:cs typeface="Calibri" pitchFamily="34" charset="0"/>
+                <a:latin typeface="Arial Narrow" pitchFamily="34" charset="0"/>
               </a:rPr>
             </a:br>
             <a:r>
               <a:rPr lang="en-US" sz="2000" dirty="0">
-                <a:latin typeface="Calibri" pitchFamily="34" charset="0"/>
-                <a:cs typeface="Calibri" pitchFamily="34" charset="0"/>
+                <a:latin typeface="Arial Narrow" pitchFamily="34" charset="0"/>
               </a:rPr>
               <a:t>	</a:t>
             </a:r>
             <a:r>
               <a:rPr lang="en-US" sz="2000" dirty="0" smtClean="0">
-                <a:latin typeface="Calibri" pitchFamily="34" charset="0"/>
-                <a:cs typeface="Calibri" pitchFamily="34" charset="0"/>
+                <a:latin typeface="Arial Narrow" pitchFamily="34" charset="0"/>
               </a:rPr>
               <a:t>	Real-time </a:t>
             </a:r>
             <a:r>
               <a:rPr lang="en-US" sz="2000" dirty="0">
-                <a:latin typeface="Calibri" pitchFamily="34" charset="0"/>
-                <a:cs typeface="Calibri" pitchFamily="34" charset="0"/>
+                <a:latin typeface="Arial Narrow" pitchFamily="34" charset="0"/>
               </a:rPr>
               <a:t>analysis</a:t>
             </a:r>
@@ -16701,8 +16232,8 @@
         </p:nvSpPr>
         <p:spPr bwMode="auto">
           <a:xfrm>
-            <a:off x="214070" y="5494347"/>
-            <a:ext cx="2876365" cy="446276"/>
+            <a:off x="1657350" y="5410200"/>
+            <a:ext cx="2760663" cy="442913"/>
           </a:xfrm>
           <a:prstGeom prst="rect">
             <a:avLst/>
@@ -16738,9 +16269,8 @@
               </a:tabLst>
             </a:pPr>
             <a:r>
-              <a:rPr lang="en-US" sz="2000" dirty="0">
-                <a:latin typeface="Calibri" pitchFamily="34" charset="0"/>
-                <a:cs typeface="Calibri" pitchFamily="34" charset="0"/>
+              <a:rPr lang="en-US" sz="2000">
+                <a:latin typeface="Arial Narrow" pitchFamily="34" charset="0"/>
               </a:rPr>
               <a:t>Code Generation Tools</a:t>
             </a:r>
@@ -17925,11 +17455,7 @@
           <a:lstStyle/>
           <a:p>
             <a:r>
-              <a:rPr lang="en-CA" sz="3200" dirty="0" smtClean="0">
-                <a:solidFill>
-                  <a:schemeClr val="tx1"/>
-                </a:solidFill>
-              </a:rPr>
+              <a:rPr lang="en-CA" sz="3200" dirty="0" smtClean="0"/>
               <a:t>CCSv5 “GUI” Environment – Space Saving</a:t>
             </a:r>
           </a:p>
@@ -17977,8 +17503,8 @@
         </p:nvSpPr>
         <p:spPr bwMode="auto">
           <a:xfrm>
-            <a:off x="1905000" y="3173413"/>
-            <a:ext cx="1828801" cy="783193"/>
+            <a:off x="2068513" y="3173413"/>
+            <a:ext cx="1665287" cy="788987"/>
           </a:xfrm>
           <a:prstGeom prst="roundRect">
             <a:avLst>
@@ -17998,7 +17524,7 @@
           </a:ln>
         </p:spPr>
         <p:txBody>
-          <a:bodyPr wrap="square">
+          <a:bodyPr>
             <a:spAutoFit/>
           </a:bodyPr>
           <a:lstStyle/>
@@ -18012,23 +17538,11 @@
               </a:spcBef>
             </a:pPr>
             <a:r>
-              <a:rPr lang="en-CA" sz="2000" dirty="0">
-                <a:latin typeface="Calibri" pitchFamily="34" charset="0"/>
-                <a:cs typeface="Calibri" pitchFamily="34" charset="0"/>
+              <a:rPr lang="en-CA" sz="2000">
+                <a:latin typeface="Arial Narrow" pitchFamily="34" charset="0"/>
               </a:rPr>
-              <a:t>Tabbed editor </a:t>
-            </a:r>
-            <a:r>
-              <a:rPr lang="en-CA" sz="2000" dirty="0" smtClean="0">
-                <a:latin typeface="Calibri" pitchFamily="34" charset="0"/>
-                <a:cs typeface="Calibri" pitchFamily="34" charset="0"/>
-              </a:rPr>
-              <a:t>windows</a:t>
-            </a:r>
-            <a:endParaRPr lang="en-CA" sz="2000" dirty="0">
-              <a:latin typeface="Calibri" pitchFamily="34" charset="0"/>
-              <a:cs typeface="Calibri" pitchFamily="34" charset="0"/>
-            </a:endParaRPr>
+              <a:t>Tabbed editor windows</a:t>
+            </a:r>
           </a:p>
         </p:txBody>
       </p:sp>
@@ -18043,7 +17557,7 @@
         <p:spPr bwMode="auto">
           <a:xfrm>
             <a:off x="5235575" y="3152775"/>
-            <a:ext cx="2673350" cy="715089"/>
+            <a:ext cx="2673350" cy="712788"/>
           </a:xfrm>
           <a:prstGeom prst="roundRect">
             <a:avLst>
@@ -18077,25 +17591,21 @@
               </a:spcBef>
             </a:pPr>
             <a:r>
-              <a:rPr lang="en-CA" sz="1800" dirty="0">
-                <a:latin typeface="Calibri" pitchFamily="34" charset="0"/>
-                <a:cs typeface="Calibri" pitchFamily="34" charset="0"/>
+              <a:rPr lang="en-CA" sz="1800">
+                <a:latin typeface="Arial Narrow" pitchFamily="34" charset="0"/>
               </a:rPr>
-              <a:t>Tab data displays </a:t>
-            </a:r>
-            <a:r>
-              <a:rPr lang="en-CA" sz="1800" dirty="0" smtClean="0">
-                <a:latin typeface="Calibri" pitchFamily="34" charset="0"/>
-                <a:cs typeface="Calibri" pitchFamily="34" charset="0"/>
+              <a:t>Tab data displays together</a:t>
+            </a:r>
+            <a:br>
+              <a:rPr lang="en-CA" sz="1800">
+                <a:latin typeface="Arial Narrow" pitchFamily="34" charset="0"/>
               </a:rPr>
-              <a:t>together to </a:t>
-            </a:r>
-            <a:r>
-              <a:rPr lang="en-CA" sz="1800" dirty="0">
-                <a:latin typeface="Calibri" pitchFamily="34" charset="0"/>
-                <a:cs typeface="Calibri" pitchFamily="34" charset="0"/>
+            </a:br>
+            <a:r>
+              <a:rPr lang="en-CA" sz="1800">
+                <a:latin typeface="Arial Narrow" pitchFamily="34" charset="0"/>
               </a:rPr>
-              <a:t>save space</a:t>
+              <a:t>to save space</a:t>
             </a:r>
           </a:p>
         </p:txBody>
@@ -18111,7 +17621,7 @@
         <p:spPr bwMode="auto">
           <a:xfrm>
             <a:off x="990600" y="5638800"/>
-            <a:ext cx="3246438" cy="715089"/>
+            <a:ext cx="3246438" cy="712788"/>
           </a:xfrm>
           <a:prstGeom prst="roundRect">
             <a:avLst>
@@ -18145,25 +17655,26 @@
               </a:spcBef>
             </a:pPr>
             <a:r>
-              <a:rPr lang="en-CA" sz="1800" dirty="0">
-                <a:latin typeface="Calibri" pitchFamily="34" charset="0"/>
-                <a:cs typeface="Calibri" pitchFamily="34" charset="0"/>
+              <a:rPr lang="en-CA" sz="1800">
+                <a:latin typeface="Arial Narrow" pitchFamily="34" charset="0"/>
               </a:rPr>
-              <a:t>Fast view windows don’t </a:t>
-            </a:r>
-            <a:r>
-              <a:rPr lang="en-CA" sz="1800" dirty="0" smtClean="0">
-                <a:latin typeface="Calibri" pitchFamily="34" charset="0"/>
-                <a:cs typeface="Calibri" pitchFamily="34" charset="0"/>
+              <a:t>Fast view windows don’t display</a:t>
+            </a:r>
+          </a:p>
+          <a:p>
+            <a:pPr algn="ctr" eaLnBrk="1" hangingPunct="1">
+              <a:lnSpc>
+                <a:spcPct val="100000"/>
+              </a:lnSpc>
+              <a:spcBef>
+                <a:spcPct val="0"/>
+              </a:spcBef>
+            </a:pPr>
+            <a:r>
+              <a:rPr lang="en-CA" sz="1800">
+                <a:latin typeface="Arial Narrow" pitchFamily="34" charset="0"/>
               </a:rPr>
-              <a:t>display until </a:t>
-            </a:r>
-            <a:r>
-              <a:rPr lang="en-CA" sz="1800" dirty="0">
-                <a:latin typeface="Calibri" pitchFamily="34" charset="0"/>
-                <a:cs typeface="Calibri" pitchFamily="34" charset="0"/>
-              </a:rPr>
-              <a:t>you click on them</a:t>
+              <a:t>Until you click on them</a:t>
             </a:r>
           </a:p>
         </p:txBody>
@@ -18178,8 +17689,8 @@
         </p:nvSpPr>
         <p:spPr bwMode="auto">
           <a:xfrm>
-            <a:off x="5410200" y="1371600"/>
-            <a:ext cx="3548063" cy="1021556"/>
+            <a:off x="5562600" y="1371600"/>
+            <a:ext cx="3395663" cy="1017588"/>
           </a:xfrm>
           <a:prstGeom prst="roundRect">
             <a:avLst>
@@ -18199,7 +17710,7 @@
           </a:ln>
         </p:spPr>
         <p:txBody>
-          <a:bodyPr wrap="square">
+          <a:bodyPr>
             <a:spAutoFit/>
           </a:bodyPr>
           <a:lstStyle/>
@@ -18213,45 +17724,38 @@
               </a:spcBef>
             </a:pPr>
             <a:r>
-              <a:rPr lang="en-CA" sz="1800" u="sng" dirty="0">
-                <a:latin typeface="Calibri" pitchFamily="34" charset="0"/>
-                <a:cs typeface="Calibri" pitchFamily="34" charset="0"/>
+              <a:rPr lang="en-CA" sz="1800" u="sng">
+                <a:latin typeface="Arial Narrow" pitchFamily="34" charset="0"/>
               </a:rPr>
               <a:t>Perspectives</a:t>
             </a:r>
             <a:r>
-              <a:rPr lang="en-CA" sz="1800" dirty="0">
-                <a:latin typeface="Calibri" pitchFamily="34" charset="0"/>
-                <a:cs typeface="Calibri" pitchFamily="34" charset="0"/>
+              <a:rPr lang="en-CA" sz="1800">
+                <a:latin typeface="Arial Narrow" pitchFamily="34" charset="0"/>
               </a:rPr>
               <a:t> contain separate</a:t>
             </a:r>
             <a:br>
-              <a:rPr lang="en-CA" sz="1800" dirty="0">
-                <a:latin typeface="Calibri" pitchFamily="34" charset="0"/>
-                <a:cs typeface="Calibri" pitchFamily="34" charset="0"/>
+              <a:rPr lang="en-CA" sz="1800">
+                <a:latin typeface="Arial Narrow" pitchFamily="34" charset="0"/>
               </a:rPr>
             </a:br>
             <a:r>
-              <a:rPr lang="en-CA" sz="1800" dirty="0">
-                <a:latin typeface="Calibri" pitchFamily="34" charset="0"/>
-                <a:cs typeface="Calibri" pitchFamily="34" charset="0"/>
+              <a:rPr lang="en-CA" sz="1800">
+                <a:latin typeface="Arial Narrow" pitchFamily="34" charset="0"/>
               </a:rPr>
-              <a:t>window arrangements </a:t>
-            </a:r>
-            <a:r>
-              <a:rPr lang="en-CA" sz="1800" dirty="0" smtClean="0">
-                <a:latin typeface="Calibri" pitchFamily="34" charset="0"/>
-                <a:cs typeface="Calibri" pitchFamily="34" charset="0"/>
+              <a:t>window arrangements depending</a:t>
+            </a:r>
+            <a:br>
+              <a:rPr lang="en-CA" sz="1800">
+                <a:latin typeface="Arial Narrow" pitchFamily="34" charset="0"/>
               </a:rPr>
-              <a:t>depending on </a:t>
-            </a:r>
-            <a:r>
-              <a:rPr lang="en-CA" sz="1800" dirty="0">
-                <a:latin typeface="Calibri" pitchFamily="34" charset="0"/>
-                <a:cs typeface="Calibri" pitchFamily="34" charset="0"/>
+            </a:br>
+            <a:r>
+              <a:rPr lang="en-CA" sz="1800">
+                <a:latin typeface="Arial Narrow" pitchFamily="34" charset="0"/>
               </a:rPr>
-              <a:t>what you are doing.</a:t>
+              <a:t>on what you are doing.</a:t>
             </a:r>
           </a:p>
         </p:txBody>
@@ -18267,9 +17771,9 @@
           <p:nvPr/>
         </p:nvCxnSpPr>
         <p:spPr bwMode="auto">
-          <a:xfrm rot="5400000" flipH="1" flipV="1">
-            <a:off x="7298975" y="1048661"/>
-            <a:ext cx="208196" cy="437683"/>
+          <a:xfrm flipV="1">
+            <a:off x="7261225" y="1163638"/>
+            <a:ext cx="360363" cy="207962"/>
           </a:xfrm>
           <a:prstGeom prst="straightConnector1">
             <a:avLst/>
@@ -18296,9 +17800,9 @@
           <p:nvPr/>
         </p:nvCxnSpPr>
         <p:spPr bwMode="auto">
-          <a:xfrm rot="5400000">
-            <a:off x="1592877" y="5565735"/>
-            <a:ext cx="232789" cy="1809097"/>
+          <a:xfrm flipH="1">
+            <a:off x="804863" y="6351588"/>
+            <a:ext cx="1809750" cy="234950"/>
           </a:xfrm>
           <a:prstGeom prst="straightConnector1">
             <a:avLst/>
@@ -18325,8 +17829,8 @@
         </p:nvCxnSpPr>
         <p:spPr bwMode="auto">
           <a:xfrm rot="16200000" flipV="1">
-            <a:off x="2549526" y="2903538"/>
-            <a:ext cx="242888" cy="296862"/>
+            <a:off x="2590800" y="2862263"/>
+            <a:ext cx="242888" cy="379412"/>
           </a:xfrm>
           <a:prstGeom prst="straightConnector1">
             <a:avLst/>
@@ -18353,8 +17857,8 @@
         </p:nvCxnSpPr>
         <p:spPr bwMode="auto">
           <a:xfrm rot="16200000" flipV="1">
-            <a:off x="6363495" y="2944020"/>
-            <a:ext cx="166686" cy="250824"/>
+            <a:off x="6363494" y="2944019"/>
+            <a:ext cx="166687" cy="250825"/>
           </a:xfrm>
           <a:prstGeom prst="straightConnector1">
             <a:avLst/>
@@ -18416,8 +17920,7 @@
             </a:pPr>
             <a:r>
               <a:rPr lang="en-CA" sz="1800">
-                <a:latin typeface="Calibri" pitchFamily="34" charset="0"/>
-                <a:cs typeface="Calibri" pitchFamily="34" charset="0"/>
+                <a:latin typeface="Arial Narrow" pitchFamily="34" charset="0"/>
               </a:rPr>
               <a:t>Customize toolbars &amp; menus</a:t>
             </a:r>
@@ -18492,8 +17995,6 @@
                   </a:srgbClr>
                 </a:outerShdw>
               </a:effectLst>
-              <a:latin typeface="Calibri" pitchFamily="34" charset="0"/>
-              <a:cs typeface="Calibri" pitchFamily="34" charset="0"/>
             </a:endParaRPr>
           </a:p>
         </p:txBody>
@@ -18538,8 +18039,6 @@
                   </a:srgbClr>
                 </a:outerShdw>
               </a:effectLst>
-              <a:latin typeface="Calibri" pitchFamily="34" charset="0"/>
-              <a:cs typeface="Calibri" pitchFamily="34" charset="0"/>
             </a:endParaRPr>
           </a:p>
         </p:txBody>
@@ -18593,11 +18092,7 @@
           <a:lstStyle/>
           <a:p>
             <a:r>
-              <a:rPr lang="en-US" dirty="0" smtClean="0">
-                <a:solidFill>
-                  <a:schemeClr val="tx1"/>
-                </a:solidFill>
-              </a:rPr>
+              <a:rPr lang="en-US" dirty="0" smtClean="0"/>
               <a:t>CCSv5 (Eclipse) Benefits</a:t>
             </a:r>
           </a:p>
@@ -18645,7 +18140,7 @@
         </p:nvSpPr>
         <p:spPr bwMode="auto">
           <a:xfrm>
-            <a:off x="3569153" y="2152650"/>
+            <a:off x="3590925" y="2152650"/>
             <a:ext cx="5562600" cy="4724400"/>
           </a:xfrm>
           <a:prstGeom prst="rect">
@@ -18679,8 +18174,6 @@
                   </a:srgbClr>
                 </a:outerShdw>
               </a:effectLst>
-              <a:latin typeface="Calibri" pitchFamily="34" charset="0"/>
-              <a:cs typeface="Calibri" pitchFamily="34" charset="0"/>
             </a:endParaRPr>
           </a:p>
         </p:txBody>
@@ -18695,8 +18188,8 @@
         </p:nvSpPr>
         <p:spPr bwMode="auto">
           <a:xfrm>
-            <a:off x="3559626" y="2246313"/>
-            <a:ext cx="4612609" cy="395173"/>
+            <a:off x="3657600" y="2246313"/>
+            <a:ext cx="4437063" cy="384175"/>
           </a:xfrm>
           <a:prstGeom prst="rect">
             <a:avLst/>
@@ -18724,9 +18217,8 @@
               <a:buChar char=""/>
             </a:pPr>
             <a:r>
-              <a:rPr lang="en-US" dirty="0">
-                <a:latin typeface="Calibri" pitchFamily="34" charset="0"/>
-                <a:cs typeface="Calibri" pitchFamily="34" charset="0"/>
+              <a:rPr lang="en-US">
+                <a:latin typeface="Arial Narrow" pitchFamily="34" charset="0"/>
               </a:rPr>
               <a:t>Eclipse Open Source Framework</a:t>
             </a:r>
@@ -18743,8 +18235,8 @@
         </p:nvSpPr>
         <p:spPr bwMode="auto">
           <a:xfrm>
-            <a:off x="3864426" y="2671763"/>
-            <a:ext cx="5363391" cy="1661993"/>
+            <a:off x="4067175" y="2671763"/>
+            <a:ext cx="4982326" cy="1661993"/>
           </a:xfrm>
           <a:prstGeom prst="rect">
             <a:avLst/>
@@ -18772,22 +18264,19 @@
             </a:pPr>
             <a:r>
               <a:rPr lang="en-US" sz="2000" dirty="0">
-                <a:latin typeface="Calibri" pitchFamily="34" charset="0"/>
-                <a:cs typeface="Calibri" pitchFamily="34" charset="0"/>
+                <a:latin typeface="Arial Narrow" pitchFamily="34" charset="0"/>
               </a:rPr>
               <a:t>  Managed make files (</a:t>
             </a:r>
             <a:r>
               <a:rPr lang="en-US" sz="2000" dirty="0" err="1">
-                <a:latin typeface="Calibri" pitchFamily="34" charset="0"/>
-                <a:cs typeface="Calibri" pitchFamily="34" charset="0"/>
+                <a:latin typeface="Arial Narrow" pitchFamily="34" charset="0"/>
               </a:rPr>
               <a:t>gMake</a:t>
             </a:r>
             <a:r>
               <a:rPr lang="en-US" sz="2000" dirty="0">
-                <a:latin typeface="Calibri" pitchFamily="34" charset="0"/>
-                <a:cs typeface="Calibri" pitchFamily="34" charset="0"/>
+                <a:latin typeface="Arial Narrow" pitchFamily="34" charset="0"/>
               </a:rPr>
               <a:t> scripting)</a:t>
             </a:r>
@@ -18802,8 +18291,7 @@
             </a:pPr>
             <a:r>
               <a:rPr lang="en-US" sz="2000" dirty="0">
-                <a:latin typeface="Calibri" pitchFamily="34" charset="0"/>
-                <a:cs typeface="Calibri" pitchFamily="34" charset="0"/>
+                <a:latin typeface="Arial Narrow" pitchFamily="34" charset="0"/>
               </a:rPr>
               <a:t>  Industry momentum (leverage work of others)</a:t>
             </a:r>
@@ -18818,21 +18306,18 @@
             </a:pPr>
             <a:r>
               <a:rPr lang="en-US" sz="2000" dirty="0">
-                <a:latin typeface="Calibri" pitchFamily="34" charset="0"/>
-                <a:cs typeface="Calibri" pitchFamily="34" charset="0"/>
+                <a:latin typeface="Arial Narrow" pitchFamily="34" charset="0"/>
               </a:rPr>
               <a:t>  Cross-platform support (</a:t>
             </a:r>
             <a:r>
               <a:rPr lang="en-US" sz="2000" dirty="0" smtClean="0">
-                <a:latin typeface="Calibri" pitchFamily="34" charset="0"/>
-                <a:cs typeface="Calibri" pitchFamily="34" charset="0"/>
+                <a:latin typeface="Arial Narrow" pitchFamily="34" charset="0"/>
               </a:rPr>
               <a:t>Windows/Linux – 5.x)</a:t>
             </a:r>
             <a:endParaRPr lang="en-US" sz="2000" dirty="0">
-              <a:latin typeface="Calibri" pitchFamily="34" charset="0"/>
-              <a:cs typeface="Calibri" pitchFamily="34" charset="0"/>
+              <a:latin typeface="Arial Narrow" pitchFamily="34" charset="0"/>
             </a:endParaRPr>
           </a:p>
           <a:p>
@@ -18845,8 +18330,7 @@
             </a:pPr>
             <a:r>
               <a:rPr lang="en-US" sz="2000" dirty="0">
-                <a:latin typeface="Calibri" pitchFamily="34" charset="0"/>
-                <a:cs typeface="Calibri" pitchFamily="34" charset="0"/>
+                <a:latin typeface="Arial Narrow" pitchFamily="34" charset="0"/>
               </a:rPr>
               <a:t>  Plug-ins – use available or create your own</a:t>
             </a:r>
@@ -18863,8 +18347,8 @@
         </p:nvSpPr>
         <p:spPr bwMode="auto">
           <a:xfrm>
-            <a:off x="3559626" y="4495800"/>
-            <a:ext cx="3215560" cy="395173"/>
+            <a:off x="3657600" y="4495800"/>
+            <a:ext cx="2973388" cy="384175"/>
           </a:xfrm>
           <a:prstGeom prst="rect">
             <a:avLst/>
@@ -18893,8 +18377,7 @@
             </a:pPr>
             <a:r>
               <a:rPr lang="en-US">
-                <a:latin typeface="Calibri" pitchFamily="34" charset="0"/>
-                <a:cs typeface="Calibri" pitchFamily="34" charset="0"/>
+                <a:latin typeface="Arial Narrow" pitchFamily="34" charset="0"/>
               </a:rPr>
               <a:t>Project Management</a:t>
             </a:r>
@@ -18911,8 +18394,8 @@
         </p:nvSpPr>
         <p:spPr bwMode="auto">
           <a:xfrm>
-            <a:off x="3864426" y="4953000"/>
-            <a:ext cx="4649927" cy="800219"/>
+            <a:off x="4067175" y="4953000"/>
+            <a:ext cx="4392613" cy="793750"/>
           </a:xfrm>
           <a:prstGeom prst="rect">
             <a:avLst/>
@@ -18940,8 +18423,7 @@
             </a:pPr>
             <a:r>
               <a:rPr lang="en-US" sz="2000">
-                <a:latin typeface="Calibri" pitchFamily="34" charset="0"/>
-                <a:cs typeface="Calibri" pitchFamily="34" charset="0"/>
+                <a:latin typeface="Arial Narrow" pitchFamily="34" charset="0"/>
               </a:rPr>
               <a:t>  Version control plug-ins (e.g. ClearCase)</a:t>
             </a:r>
@@ -18956,8 +18438,7 @@
             </a:pPr>
             <a:r>
               <a:rPr lang="en-US" sz="2000">
-                <a:latin typeface="Calibri" pitchFamily="34" charset="0"/>
-                <a:cs typeface="Calibri" pitchFamily="34" charset="0"/>
+                <a:latin typeface="Arial Narrow" pitchFamily="34" charset="0"/>
               </a:rPr>
               <a:t>  BIOS/CGT version PER PROJECT </a:t>
             </a:r>
@@ -18974,8 +18455,8 @@
         </p:nvSpPr>
         <p:spPr bwMode="auto">
           <a:xfrm>
-            <a:off x="3559626" y="5867400"/>
-            <a:ext cx="5250412" cy="875304"/>
+            <a:off x="3657600" y="5867400"/>
+            <a:ext cx="5135563" cy="868363"/>
           </a:xfrm>
           <a:prstGeom prst="rect">
             <a:avLst/>
@@ -19004,8 +18485,7 @@
             </a:pPr>
             <a:r>
               <a:rPr lang="en-US">
-                <a:latin typeface="Calibri" pitchFamily="34" charset="0"/>
-                <a:cs typeface="Calibri" pitchFamily="34" charset="0"/>
+                <a:latin typeface="Arial Narrow" pitchFamily="34" charset="0"/>
               </a:rPr>
               <a:t>Licensing (free tools, floating license)</a:t>
             </a:r>
@@ -19021,8 +18501,7 @@
             </a:pPr>
             <a:r>
               <a:rPr lang="en-US">
-                <a:latin typeface="Calibri" pitchFamily="34" charset="0"/>
-                <a:cs typeface="Calibri" pitchFamily="34" charset="0"/>
+                <a:latin typeface="Arial Narrow" pitchFamily="34" charset="0"/>
               </a:rPr>
               <a:t>Updates available via internet</a:t>
             </a:r>
@@ -19172,8 +18651,6 @@
                 <a:solidFill>
                   <a:srgbClr val="000000"/>
                 </a:solidFill>
-                <a:latin typeface="Calibri" pitchFamily="34" charset="0"/>
-                <a:cs typeface="Calibri" pitchFamily="34" charset="0"/>
               </a:rPr>
               <a:t>Intro to CCSv5</a:t>
             </a:r>
@@ -19181,8 +18658,6 @@
               <a:solidFill>
                 <a:srgbClr val="000000"/>
               </a:solidFill>
-              <a:latin typeface="Calibri" pitchFamily="34" charset="0"/>
-              <a:cs typeface="Calibri" pitchFamily="34" charset="0"/>
             </a:endParaRPr>
           </a:p>
         </p:txBody>
@@ -19242,8 +18717,6 @@
                 <a:solidFill>
                   <a:srgbClr val="000000"/>
                 </a:solidFill>
-                <a:latin typeface="Calibri" pitchFamily="34" charset="0"/>
-                <a:cs typeface="Calibri" pitchFamily="34" charset="0"/>
               </a:rPr>
               <a:t>Functional Overview</a:t>
             </a:r>
@@ -19251,8 +18724,6 @@
               <a:solidFill>
                 <a:srgbClr val="000000"/>
               </a:solidFill>
-              <a:latin typeface="Calibri" pitchFamily="34" charset="0"/>
-              <a:cs typeface="Calibri" pitchFamily="34" charset="0"/>
             </a:endParaRPr>
           </a:p>
         </p:txBody>
@@ -19316,8 +18787,6 @@
                 <a:solidFill>
                   <a:srgbClr val="000000"/>
                 </a:solidFill>
-                <a:latin typeface="Calibri" pitchFamily="34" charset="0"/>
-                <a:cs typeface="Calibri" pitchFamily="34" charset="0"/>
               </a:rPr>
               <a:t>Perspectives</a:t>
             </a:r>
@@ -19325,8 +18794,6 @@
               <a:solidFill>
                 <a:srgbClr val="000000"/>
               </a:solidFill>
-              <a:latin typeface="Calibri" pitchFamily="34" charset="0"/>
-              <a:cs typeface="Calibri" pitchFamily="34" charset="0"/>
             </a:endParaRPr>
           </a:p>
         </p:txBody>
@@ -19386,8 +18853,6 @@
                 <a:solidFill>
                   <a:srgbClr val="000000"/>
                 </a:solidFill>
-                <a:latin typeface="Calibri" pitchFamily="34" charset="0"/>
-                <a:cs typeface="Calibri" pitchFamily="34" charset="0"/>
               </a:rPr>
               <a:t>Projects</a:t>
             </a:r>
@@ -19395,8 +18860,6 @@
               <a:solidFill>
                 <a:srgbClr val="000000"/>
               </a:solidFill>
-              <a:latin typeface="Calibri" pitchFamily="34" charset="0"/>
-              <a:cs typeface="Calibri" pitchFamily="34" charset="0"/>
             </a:endParaRPr>
           </a:p>
         </p:txBody>
@@ -19452,12 +18915,10 @@
               <a:buChar char=""/>
             </a:pPr>
             <a:r>
-              <a:rPr lang="en-US" dirty="0" smtClean="0">
+              <a:rPr lang="en-US" smtClean="0">
                 <a:solidFill>
                   <a:srgbClr val="000000"/>
                 </a:solidFill>
-                <a:latin typeface="Calibri" pitchFamily="34" charset="0"/>
-                <a:cs typeface="Calibri" pitchFamily="34" charset="0"/>
               </a:rPr>
               <a:t>Target Configuration</a:t>
             </a:r>
@@ -19465,8 +18926,6 @@
               <a:solidFill>
                 <a:srgbClr val="000000"/>
               </a:solidFill>
-              <a:latin typeface="Calibri" pitchFamily="34" charset="0"/>
-              <a:cs typeface="Calibri" pitchFamily="34" charset="0"/>
             </a:endParaRPr>
           </a:p>
         </p:txBody>
@@ -19526,8 +18985,6 @@
                 <a:solidFill>
                   <a:srgbClr val="000000"/>
                 </a:solidFill>
-                <a:latin typeface="Calibri" pitchFamily="34" charset="0"/>
-                <a:cs typeface="Calibri" pitchFamily="34" charset="0"/>
               </a:rPr>
               <a:t>Build Config &amp; Options</a:t>
             </a:r>
@@ -19535,8 +18992,6 @@
               <a:solidFill>
                 <a:srgbClr val="000000"/>
               </a:solidFill>
-              <a:latin typeface="Calibri" pitchFamily="34" charset="0"/>
-              <a:cs typeface="Calibri" pitchFamily="34" charset="0"/>
             </a:endParaRPr>
           </a:p>
         </p:txBody>
@@ -19596,8 +19051,6 @@
                 <a:solidFill>
                   <a:srgbClr val="000000"/>
                 </a:solidFill>
-                <a:latin typeface="Calibri" pitchFamily="34" charset="0"/>
-                <a:cs typeface="Calibri" pitchFamily="34" charset="0"/>
               </a:rPr>
               <a:t>Licensing/Pricing</a:t>
             </a:r>
@@ -19605,8 +19058,6 @@
               <a:solidFill>
                 <a:srgbClr val="000000"/>
               </a:solidFill>
-              <a:latin typeface="Calibri" pitchFamily="34" charset="0"/>
-              <a:cs typeface="Calibri" pitchFamily="34" charset="0"/>
             </a:endParaRPr>
           </a:p>
         </p:txBody>
@@ -19666,8 +19117,6 @@
                 <a:solidFill>
                   <a:srgbClr val="000000"/>
                 </a:solidFill>
-                <a:latin typeface="Calibri" pitchFamily="34" charset="0"/>
-                <a:cs typeface="Calibri" pitchFamily="34" charset="0"/>
               </a:rPr>
               <a:t>CCSv5 – For More Info…</a:t>
             </a:r>
@@ -19675,8 +19124,6 @@
               <a:solidFill>
                 <a:srgbClr val="000000"/>
               </a:solidFill>
-              <a:latin typeface="Calibri" pitchFamily="34" charset="0"/>
-              <a:cs typeface="Calibri" pitchFamily="34" charset="0"/>
             </a:endParaRPr>
           </a:p>
         </p:txBody>
@@ -19719,39 +19166,6 @@
       </p:grpSpPr>
       <p:sp>
         <p:nvSpPr>
-          <p:cNvPr id="13" name="TextBox 12"/>
-          <p:cNvSpPr txBox="1"/>
-          <p:nvPr/>
-        </p:nvSpPr>
-        <p:spPr>
-          <a:xfrm>
-            <a:off x="228600" y="6435501"/>
-            <a:ext cx="8686800" cy="387798"/>
-          </a:xfrm>
-          <a:prstGeom prst="rect">
-            <a:avLst/>
-          </a:prstGeom>
-          <a:solidFill>
-            <a:schemeClr val="bg1"/>
-          </a:solidFill>
-        </p:spPr>
-        <p:txBody>
-          <a:bodyPr wrap="square" rtlCol="0" anchor="ctr" anchorCtr="0">
-            <a:spAutoFit/>
-          </a:bodyPr>
-          <a:lstStyle/>
-          <a:p>
-            <a:endParaRPr lang="en-US" dirty="0" smtClean="0">
-              <a:solidFill>
-                <a:schemeClr val="dk1"/>
-              </a:solidFill>
-              <a:effectLst/>
-            </a:endParaRPr>
-          </a:p>
-        </p:txBody>
-      </p:sp>
-      <p:sp>
-        <p:nvSpPr>
           <p:cNvPr id="11266" name="Rectangle 2"/>
           <p:cNvSpPr>
             <a:spLocks noGrp="1" noChangeArrowheads="1"/>
@@ -19766,11 +19180,7 @@
           <a:lstStyle/>
           <a:p>
             <a:r>
-              <a:rPr lang="en-US" dirty="0" smtClean="0">
-                <a:solidFill>
-                  <a:schemeClr val="tx1"/>
-                </a:solidFill>
-              </a:rPr>
+              <a:rPr lang="en-US" smtClean="0"/>
               <a:t>Perspectives</a:t>
             </a:r>
           </a:p>

</xml_diff>

<commit_message>
Revised to new template RJH
</commit_message>
<xml_diff>
--- a/slides/Intro to CCSv5.pptx
+++ b/slides/Intro to CCSv5.pptx
@@ -5235,11 +5235,6 @@
               </a:rPr>
               <a:t>Introduction to CCSv5</a:t>
             </a:r>
-            <a:endParaRPr lang="en-US" dirty="0" smtClean="0">
-              <a:solidFill>
-                <a:srgbClr val="DE0000"/>
-              </a:solidFill>
-            </a:endParaRPr>
           </a:p>
         </p:txBody>
       </p:sp>
@@ -6609,19 +6604,8 @@
                 <a:latin typeface="Calibri" pitchFamily="34" charset="0"/>
                 <a:cs typeface="Calibri" pitchFamily="34" charset="0"/>
               </a:rPr>
-              <a:t>Not using SYS/BIOS</a:t>
-            </a:r>
-            <a:r>
-              <a:rPr lang="en-US" sz="2000" dirty="0" smtClean="0">
-                <a:latin typeface="Calibri" pitchFamily="34" charset="0"/>
-                <a:cs typeface="Calibri" pitchFamily="34" charset="0"/>
-              </a:rPr>
-              <a:t>? </a:t>
-            </a:r>
-            <a:endParaRPr lang="en-US" sz="2000" dirty="0" smtClean="0">
-              <a:latin typeface="Calibri" pitchFamily="34" charset="0"/>
-              <a:cs typeface="Calibri" pitchFamily="34" charset="0"/>
-            </a:endParaRPr>
+              <a:t>Not using SYS/BIOS? </a:t>
+            </a:r>
           </a:p>
           <a:p>
             <a:pPr marL="639763" lvl="1" indent="-285750" eaLnBrk="0" hangingPunct="0">
@@ -9188,27 +9172,7 @@
                 <a:latin typeface="Calibri" pitchFamily="34" charset="0"/>
                 <a:cs typeface="Calibri" pitchFamily="34" charset="0"/>
               </a:rPr>
-              <a:t>For </a:t>
-            </a:r>
-            <a:r>
-              <a:rPr lang="en-US" sz="2400" dirty="0" smtClean="0">
-                <a:solidFill>
-                  <a:srgbClr val="000000"/>
-                </a:solidFill>
-                <a:latin typeface="Calibri" pitchFamily="34" charset="0"/>
-                <a:cs typeface="Calibri" pitchFamily="34" charset="0"/>
-              </a:rPr>
-              <a:t>More </a:t>
-            </a:r>
-            <a:r>
-              <a:rPr lang="en-US" sz="2400" dirty="0" smtClean="0">
-                <a:solidFill>
-                  <a:srgbClr val="000000"/>
-                </a:solidFill>
-                <a:latin typeface="Calibri" pitchFamily="34" charset="0"/>
-                <a:cs typeface="Calibri" pitchFamily="34" charset="0"/>
-              </a:rPr>
-              <a:t>Information</a:t>
+              <a:t>For More Information</a:t>
             </a:r>
             <a:endParaRPr lang="en-US" sz="2400" dirty="0">
               <a:solidFill>
@@ -11457,14 +11421,7 @@
                 <a:latin typeface="Calibri" pitchFamily="34" charset="0"/>
                 <a:cs typeface="Calibri" pitchFamily="34" charset="0"/>
               </a:rPr>
-              <a:t>  </a:t>
-            </a:r>
-            <a:r>
-              <a:rPr lang="en-US" sz="2000" dirty="0">
-                <a:latin typeface="Calibri" pitchFamily="34" charset="0"/>
-                <a:cs typeface="Calibri" pitchFamily="34" charset="0"/>
-              </a:rPr>
-              <a:t>Reasonable pricing – includes FREE options noted below</a:t>
+              <a:t>  Reasonable pricing – includes FREE options noted below</a:t>
             </a:r>
           </a:p>
         </p:txBody>
@@ -11785,11 +11742,7 @@
           <a:p>
             <a:r>
               <a:rPr lang="en-US" dirty="0" smtClean="0"/>
-              <a:t>For </a:t>
-            </a:r>
-            <a:r>
-              <a:rPr lang="en-US" dirty="0" smtClean="0"/>
-              <a:t>More Information</a:t>
+              <a:t>For More Information</a:t>
             </a:r>
           </a:p>
         </p:txBody>
@@ -11882,14 +11835,7 @@
                 <a:latin typeface="Calibri" pitchFamily="34" charset="0"/>
                 <a:cs typeface="Calibri" pitchFamily="34" charset="0"/>
               </a:rPr>
-              <a:t>Downloading </a:t>
-            </a:r>
-            <a:r>
-              <a:rPr lang="en-US" sz="2000" dirty="0" smtClean="0">
-                <a:latin typeface="Calibri" pitchFamily="34" charset="0"/>
-                <a:cs typeface="Calibri" pitchFamily="34" charset="0"/>
-              </a:rPr>
-              <a:t>CCSv5</a:t>
+              <a:t>Downloading CCSv5</a:t>
             </a:r>
             <a:endParaRPr lang="en-US" sz="2000" dirty="0">
               <a:latin typeface="Calibri" pitchFamily="34" charset="0"/>
@@ -11995,14 +11941,7 @@
                 <a:latin typeface="Calibri" pitchFamily="34" charset="0"/>
                 <a:cs typeface="Calibri" pitchFamily="34" charset="0"/>
               </a:rPr>
-              <a:t>Etc</a:t>
-            </a:r>
-            <a:r>
-              <a:rPr lang="en-US" sz="2000" dirty="0" smtClean="0">
-                <a:latin typeface="Calibri" pitchFamily="34" charset="0"/>
-                <a:cs typeface="Calibri" pitchFamily="34" charset="0"/>
-              </a:rPr>
-              <a:t>.</a:t>
+              <a:t>Etc.</a:t>
             </a:r>
             <a:endParaRPr lang="en-US" sz="2000" dirty="0">
               <a:latin typeface="Calibri" pitchFamily="34" charset="0"/>

</xml_diff>